<commit_message>
show pics, then master
</commit_message>
<xml_diff>
--- a/MotionDetection+ObjectTrackingV4.pptx
+++ b/MotionDetection+ObjectTrackingV4.pptx
@@ -304,7 +304,7 @@
           <a:p>
             <a:fld id="{7F847C87-CECF-4A9A-88F5-87615B577ED8}" type="datetimeFigureOut">
               <a:rPr lang="de-DE" smtClean="0"/>
-              <a:t>26.12.2017</a:t>
+              <a:t>30.12.2017</a:t>
             </a:fld>
             <a:endParaRPr lang="de-DE"/>
           </a:p>
@@ -474,7 +474,7 @@
           <a:p>
             <a:fld id="{7F847C87-CECF-4A9A-88F5-87615B577ED8}" type="datetimeFigureOut">
               <a:rPr lang="de-DE" smtClean="0"/>
-              <a:t>26.12.2017</a:t>
+              <a:t>30.12.2017</a:t>
             </a:fld>
             <a:endParaRPr lang="de-DE"/>
           </a:p>
@@ -654,7 +654,7 @@
           <a:p>
             <a:fld id="{7F847C87-CECF-4A9A-88F5-87615B577ED8}" type="datetimeFigureOut">
               <a:rPr lang="de-DE" smtClean="0"/>
-              <a:t>26.12.2017</a:t>
+              <a:t>30.12.2017</a:t>
             </a:fld>
             <a:endParaRPr lang="de-DE"/>
           </a:p>
@@ -881,7 +881,7 @@
           <a:p>
             <a:fld id="{7F847C87-CECF-4A9A-88F5-87615B577ED8}" type="datetimeFigureOut">
               <a:rPr lang="de-DE" smtClean="0"/>
-              <a:t>26.12.2017</a:t>
+              <a:t>30.12.2017</a:t>
             </a:fld>
             <a:endParaRPr lang="de-DE"/>
           </a:p>
@@ -1134,7 +1134,7 @@
           <a:p>
             <a:fld id="{7F847C87-CECF-4A9A-88F5-87615B577ED8}" type="datetimeFigureOut">
               <a:rPr lang="de-DE" smtClean="0"/>
-              <a:t>26.12.2017</a:t>
+              <a:t>30.12.2017</a:t>
             </a:fld>
             <a:endParaRPr lang="de-DE"/>
           </a:p>
@@ -1422,7 +1422,7 @@
           <a:p>
             <a:fld id="{7F847C87-CECF-4A9A-88F5-87615B577ED8}" type="datetimeFigureOut">
               <a:rPr lang="de-DE" smtClean="0"/>
-              <a:t>26.12.2017</a:t>
+              <a:t>30.12.2017</a:t>
             </a:fld>
             <a:endParaRPr lang="de-DE"/>
           </a:p>
@@ -1844,7 +1844,7 @@
           <a:p>
             <a:fld id="{7F847C87-CECF-4A9A-88F5-87615B577ED8}" type="datetimeFigureOut">
               <a:rPr lang="de-DE" smtClean="0"/>
-              <a:t>26.12.2017</a:t>
+              <a:t>30.12.2017</a:t>
             </a:fld>
             <a:endParaRPr lang="de-DE"/>
           </a:p>
@@ -1962,7 +1962,7 @@
           <a:p>
             <a:fld id="{7F847C87-CECF-4A9A-88F5-87615B577ED8}" type="datetimeFigureOut">
               <a:rPr lang="de-DE" smtClean="0"/>
-              <a:t>26.12.2017</a:t>
+              <a:t>30.12.2017</a:t>
             </a:fld>
             <a:endParaRPr lang="de-DE"/>
           </a:p>
@@ -2057,7 +2057,7 @@
           <a:p>
             <a:fld id="{7F847C87-CECF-4A9A-88F5-87615B577ED8}" type="datetimeFigureOut">
               <a:rPr lang="de-DE" smtClean="0"/>
-              <a:t>26.12.2017</a:t>
+              <a:t>30.12.2017</a:t>
             </a:fld>
             <a:endParaRPr lang="de-DE"/>
           </a:p>
@@ -2334,7 +2334,7 @@
           <a:p>
             <a:fld id="{7F847C87-CECF-4A9A-88F5-87615B577ED8}" type="datetimeFigureOut">
               <a:rPr lang="de-DE" smtClean="0"/>
-              <a:t>26.12.2017</a:t>
+              <a:t>30.12.2017</a:t>
             </a:fld>
             <a:endParaRPr lang="de-DE"/>
           </a:p>
@@ -2587,7 +2587,7 @@
           <a:p>
             <a:fld id="{7F847C87-CECF-4A9A-88F5-87615B577ED8}" type="datetimeFigureOut">
               <a:rPr lang="de-DE" smtClean="0"/>
-              <a:t>26.12.2017</a:t>
+              <a:t>30.12.2017</a:t>
             </a:fld>
             <a:endParaRPr lang="de-DE"/>
           </a:p>
@@ -2785,7 +2785,7 @@
           <a:p>
             <a:fld id="{7F847C87-CECF-4A9A-88F5-87615B577ED8}" type="datetimeFigureOut">
               <a:rPr lang="de-DE" smtClean="0"/>
-              <a:t>26.12.2017</a:t>
+              <a:t>30.12.2017</a:t>
             </a:fld>
             <a:endParaRPr lang="de-DE"/>
           </a:p>
@@ -10670,12 +10670,16 @@
           <a:p>
             <a:pPr marL="0" lvl="1"/>
             <a:r>
-              <a:rPr lang="de-DE" sz="1000" b="1" dirty="0">
-                <a:latin typeface="Arial" panose="020B0604020202020204" pitchFamily="34" charset="0"/>
-                <a:cs typeface="Arial" panose="020B0604020202020204" pitchFamily="34" charset="0"/>
-              </a:rPr>
-              <a:t>Scene</a:t>
-            </a:r>
+              <a:rPr lang="de-DE" sz="1000" b="1" dirty="0" err="1" smtClean="0">
+                <a:latin typeface="Arial" panose="020B0604020202020204" pitchFamily="34" charset="0"/>
+                <a:cs typeface="Arial" panose="020B0604020202020204" pitchFamily="34" charset="0"/>
+              </a:rPr>
+              <a:t>SceneTracker</a:t>
+            </a:r>
+            <a:endParaRPr lang="de-DE" sz="1000" b="1" dirty="0">
+              <a:latin typeface="Arial" panose="020B0604020202020204" pitchFamily="34" charset="0"/>
+              <a:cs typeface="Arial" panose="020B0604020202020204" pitchFamily="34" charset="0"/>
+            </a:endParaRPr>
           </a:p>
           <a:p>
             <a:pPr marL="171450" lvl="1" indent="-171450">
@@ -11153,7 +11157,7 @@
                 <a:latin typeface="Arial" panose="020B0604020202020204" pitchFamily="34" charset="0"/>
                 <a:cs typeface="Arial" panose="020B0604020202020204" pitchFamily="34" charset="0"/>
               </a:rPr>
-              <a:t>FrameHandling</a:t>
+              <a:t>FrameHandler</a:t>
             </a:r>
             <a:endParaRPr lang="de-DE" sz="1000" b="1" dirty="0">
               <a:latin typeface="Arial" panose="020B0604020202020204" pitchFamily="34" charset="0"/>
@@ -12026,11 +12030,11 @@
           <a:p>
             <a:pPr marL="0" lvl="1"/>
             <a:r>
-              <a:rPr lang="de-DE" sz="1000" b="1" dirty="0" err="1" smtClean="0">
-                <a:latin typeface="Arial" panose="020B0604020202020204" pitchFamily="34" charset="0"/>
-                <a:cs typeface="Arial" panose="020B0604020202020204" pitchFamily="34" charset="0"/>
-              </a:rPr>
-              <a:t>Persistence</a:t>
+              <a:rPr lang="de-DE" sz="1000" b="1" smtClean="0">
+                <a:latin typeface="Arial" panose="020B0604020202020204" pitchFamily="34" charset="0"/>
+                <a:cs typeface="Arial" panose="020B0604020202020204" pitchFamily="34" charset="0"/>
+              </a:rPr>
+              <a:t>CountRecorder</a:t>
             </a:r>
             <a:endParaRPr lang="de-DE" sz="1000" b="1" dirty="0">
               <a:latin typeface="Arial" panose="020B0604020202020204" pitchFamily="34" charset="0"/>
@@ -12352,222 +12356,6 @@
           </a:fontRef>
         </p:style>
       </p:cxnSp>
-      <p:sp>
-        <p:nvSpPr>
-          <p:cNvPr id="3" name="Rechteckige Legende 2"/>
-          <p:cNvSpPr/>
-          <p:nvPr/>
-        </p:nvSpPr>
-        <p:spPr>
-          <a:xfrm>
-            <a:off x="7479787" y="2362813"/>
-            <a:ext cx="1124661" cy="517423"/>
-          </a:xfrm>
-          <a:prstGeom prst="wedgeRectCallout">
-            <a:avLst/>
-          </a:prstGeom>
-          <a:solidFill>
-            <a:srgbClr val="FFFF00"/>
-          </a:solidFill>
-          <a:ln w="19050">
-            <a:solidFill>
-              <a:schemeClr val="tx1"/>
-            </a:solidFill>
-          </a:ln>
-        </p:spPr>
-        <p:style>
-          <a:lnRef idx="2">
-            <a:schemeClr val="accent1">
-              <a:shade val="50000"/>
-            </a:schemeClr>
-          </a:lnRef>
-          <a:fillRef idx="1">
-            <a:schemeClr val="accent1"/>
-          </a:fillRef>
-          <a:effectRef idx="0">
-            <a:schemeClr val="accent1"/>
-          </a:effectRef>
-          <a:fontRef idx="minor">
-            <a:schemeClr val="lt1"/>
-          </a:fontRef>
-        </p:style>
-        <p:txBody>
-          <a:bodyPr rtlCol="0" anchor="ctr"/>
-          <a:lstStyle/>
-          <a:p>
-            <a:pPr algn="ctr"/>
-            <a:r>
-              <a:rPr lang="de-DE" sz="1000" dirty="0" err="1" smtClean="0">
-                <a:solidFill>
-                  <a:srgbClr val="FF0000"/>
-                </a:solidFill>
-              </a:rPr>
-              <a:t>possibly</a:t>
-            </a:r>
-            <a:r>
-              <a:rPr lang="de-DE" sz="1000" dirty="0" smtClean="0">
-                <a:solidFill>
-                  <a:srgbClr val="FF0000"/>
-                </a:solidFill>
-              </a:rPr>
-              <a:t> </a:t>
-            </a:r>
-            <a:r>
-              <a:rPr lang="de-DE" sz="1000" dirty="0" err="1" smtClean="0">
-                <a:solidFill>
-                  <a:srgbClr val="FF0000"/>
-                </a:solidFill>
-              </a:rPr>
-              <a:t>rename</a:t>
-            </a:r>
-            <a:r>
-              <a:rPr lang="de-DE" sz="1000" dirty="0" smtClean="0">
-                <a:solidFill>
-                  <a:srgbClr val="FF0000"/>
-                </a:solidFill>
-              </a:rPr>
-              <a:t> </a:t>
-            </a:r>
-            <a:r>
-              <a:rPr lang="de-DE" sz="1000" dirty="0" err="1" smtClean="0">
-                <a:solidFill>
-                  <a:srgbClr val="FF0000"/>
-                </a:solidFill>
-              </a:rPr>
-              <a:t>into</a:t>
-            </a:r>
-            <a:r>
-              <a:rPr lang="de-DE" sz="1000" dirty="0" smtClean="0">
-                <a:solidFill>
-                  <a:srgbClr val="FF0000"/>
-                </a:solidFill>
-              </a:rPr>
-              <a:t> "</a:t>
-            </a:r>
-            <a:r>
-              <a:rPr lang="de-DE" sz="1000" dirty="0" err="1" smtClean="0">
-                <a:solidFill>
-                  <a:srgbClr val="FF0000"/>
-                </a:solidFill>
-              </a:rPr>
-              <a:t>Tracker</a:t>
-            </a:r>
-            <a:r>
-              <a:rPr lang="de-DE" sz="1000" dirty="0">
-                <a:solidFill>
-                  <a:srgbClr val="FF0000"/>
-                </a:solidFill>
-              </a:rPr>
-              <a:t>"</a:t>
-            </a:r>
-            <a:endParaRPr lang="de-DE" sz="1000" dirty="0">
-              <a:solidFill>
-                <a:srgbClr val="FF0000"/>
-              </a:solidFill>
-            </a:endParaRPr>
-          </a:p>
-        </p:txBody>
-      </p:sp>
-      <p:sp>
-        <p:nvSpPr>
-          <p:cNvPr id="31" name="Rechteckige Legende 30"/>
-          <p:cNvSpPr/>
-          <p:nvPr/>
-        </p:nvSpPr>
-        <p:spPr>
-          <a:xfrm>
-            <a:off x="3314573" y="2191052"/>
-            <a:ext cx="1124661" cy="517423"/>
-          </a:xfrm>
-          <a:prstGeom prst="wedgeRectCallout">
-            <a:avLst/>
-          </a:prstGeom>
-          <a:solidFill>
-            <a:srgbClr val="FFFF00"/>
-          </a:solidFill>
-          <a:ln w="19050">
-            <a:solidFill>
-              <a:schemeClr val="tx1"/>
-            </a:solidFill>
-          </a:ln>
-        </p:spPr>
-        <p:style>
-          <a:lnRef idx="2">
-            <a:schemeClr val="accent1">
-              <a:shade val="50000"/>
-            </a:schemeClr>
-          </a:lnRef>
-          <a:fillRef idx="1">
-            <a:schemeClr val="accent1"/>
-          </a:fillRef>
-          <a:effectRef idx="0">
-            <a:schemeClr val="accent1"/>
-          </a:effectRef>
-          <a:fontRef idx="minor">
-            <a:schemeClr val="lt1"/>
-          </a:fontRef>
-        </p:style>
-        <p:txBody>
-          <a:bodyPr rtlCol="0" anchor="ctr"/>
-          <a:lstStyle/>
-          <a:p>
-            <a:pPr algn="ctr"/>
-            <a:r>
-              <a:rPr lang="de-DE" sz="1000" dirty="0" err="1" smtClean="0">
-                <a:solidFill>
-                  <a:srgbClr val="FF0000"/>
-                </a:solidFill>
-              </a:rPr>
-              <a:t>rename</a:t>
-            </a:r>
-            <a:r>
-              <a:rPr lang="de-DE" sz="1000" dirty="0" smtClean="0">
-                <a:solidFill>
-                  <a:srgbClr val="FF0000"/>
-                </a:solidFill>
-              </a:rPr>
-              <a:t> </a:t>
-            </a:r>
-            <a:r>
-              <a:rPr lang="de-DE" sz="1000" dirty="0" err="1" smtClean="0">
-                <a:solidFill>
-                  <a:srgbClr val="FF0000"/>
-                </a:solidFill>
-              </a:rPr>
-              <a:t>into</a:t>
-            </a:r>
-            <a:r>
-              <a:rPr lang="de-DE" sz="1000" dirty="0" smtClean="0">
-                <a:solidFill>
-                  <a:srgbClr val="FF0000"/>
-                </a:solidFill>
-              </a:rPr>
-              <a:t> "</a:t>
-            </a:r>
-            <a:r>
-              <a:rPr lang="de-DE" sz="1000" dirty="0" err="1" smtClean="0">
-                <a:solidFill>
-                  <a:srgbClr val="FF0000"/>
-                </a:solidFill>
-              </a:rPr>
-              <a:t>FrameHandler</a:t>
-            </a:r>
-            <a:r>
-              <a:rPr lang="de-DE" sz="1000" smtClean="0">
-                <a:solidFill>
-                  <a:srgbClr val="FF0000"/>
-                </a:solidFill>
-              </a:rPr>
-              <a:t>"</a:t>
-            </a:r>
-            <a:endParaRPr lang="de-DE" sz="1000" dirty="0">
-              <a:solidFill>
-                <a:srgbClr val="FF0000"/>
-              </a:solidFill>
-            </a:endParaRPr>
-          </a:p>
-        </p:txBody>
-      </p:sp>
     </p:spTree>
     <p:extLst>
       <p:ext uri="{BB962C8B-B14F-4D97-AF65-F5344CB8AC3E}">

</xml_diff>

<commit_message>
cleaned up for test case program_options
</commit_message>
<xml_diff>
--- a/MotionDetection+ObjectTrackingV4.pptx
+++ b/MotionDetection+ObjectTrackingV4.pptx
@@ -304,7 +304,7 @@
           <a:p>
             <a:fld id="{7F847C87-CECF-4A9A-88F5-87615B577ED8}" type="datetimeFigureOut">
               <a:rPr lang="de-DE" smtClean="0"/>
-              <a:t>30.12.2017</a:t>
+              <a:t>14.01.2018</a:t>
             </a:fld>
             <a:endParaRPr lang="de-DE"/>
           </a:p>
@@ -474,7 +474,7 @@
           <a:p>
             <a:fld id="{7F847C87-CECF-4A9A-88F5-87615B577ED8}" type="datetimeFigureOut">
               <a:rPr lang="de-DE" smtClean="0"/>
-              <a:t>30.12.2017</a:t>
+              <a:t>14.01.2018</a:t>
             </a:fld>
             <a:endParaRPr lang="de-DE"/>
           </a:p>
@@ -654,7 +654,7 @@
           <a:p>
             <a:fld id="{7F847C87-CECF-4A9A-88F5-87615B577ED8}" type="datetimeFigureOut">
               <a:rPr lang="de-DE" smtClean="0"/>
-              <a:t>30.12.2017</a:t>
+              <a:t>14.01.2018</a:t>
             </a:fld>
             <a:endParaRPr lang="de-DE"/>
           </a:p>
@@ -881,7 +881,7 @@
           <a:p>
             <a:fld id="{7F847C87-CECF-4A9A-88F5-87615B577ED8}" type="datetimeFigureOut">
               <a:rPr lang="de-DE" smtClean="0"/>
-              <a:t>30.12.2017</a:t>
+              <a:t>14.01.2018</a:t>
             </a:fld>
             <a:endParaRPr lang="de-DE"/>
           </a:p>
@@ -1134,7 +1134,7 @@
           <a:p>
             <a:fld id="{7F847C87-CECF-4A9A-88F5-87615B577ED8}" type="datetimeFigureOut">
               <a:rPr lang="de-DE" smtClean="0"/>
-              <a:t>30.12.2017</a:t>
+              <a:t>14.01.2018</a:t>
             </a:fld>
             <a:endParaRPr lang="de-DE"/>
           </a:p>
@@ -1422,7 +1422,7 @@
           <a:p>
             <a:fld id="{7F847C87-CECF-4A9A-88F5-87615B577ED8}" type="datetimeFigureOut">
               <a:rPr lang="de-DE" smtClean="0"/>
-              <a:t>30.12.2017</a:t>
+              <a:t>14.01.2018</a:t>
             </a:fld>
             <a:endParaRPr lang="de-DE"/>
           </a:p>
@@ -1844,7 +1844,7 @@
           <a:p>
             <a:fld id="{7F847C87-CECF-4A9A-88F5-87615B577ED8}" type="datetimeFigureOut">
               <a:rPr lang="de-DE" smtClean="0"/>
-              <a:t>30.12.2017</a:t>
+              <a:t>14.01.2018</a:t>
             </a:fld>
             <a:endParaRPr lang="de-DE"/>
           </a:p>
@@ -1962,7 +1962,7 @@
           <a:p>
             <a:fld id="{7F847C87-CECF-4A9A-88F5-87615B577ED8}" type="datetimeFigureOut">
               <a:rPr lang="de-DE" smtClean="0"/>
-              <a:t>30.12.2017</a:t>
+              <a:t>14.01.2018</a:t>
             </a:fld>
             <a:endParaRPr lang="de-DE"/>
           </a:p>
@@ -2057,7 +2057,7 @@
           <a:p>
             <a:fld id="{7F847C87-CECF-4A9A-88F5-87615B577ED8}" type="datetimeFigureOut">
               <a:rPr lang="de-DE" smtClean="0"/>
-              <a:t>30.12.2017</a:t>
+              <a:t>14.01.2018</a:t>
             </a:fld>
             <a:endParaRPr lang="de-DE"/>
           </a:p>
@@ -2334,7 +2334,7 @@
           <a:p>
             <a:fld id="{7F847C87-CECF-4A9A-88F5-87615B577ED8}" type="datetimeFigureOut">
               <a:rPr lang="de-DE" smtClean="0"/>
-              <a:t>30.12.2017</a:t>
+              <a:t>14.01.2018</a:t>
             </a:fld>
             <a:endParaRPr lang="de-DE"/>
           </a:p>
@@ -2587,7 +2587,7 @@
           <a:p>
             <a:fld id="{7F847C87-CECF-4A9A-88F5-87615B577ED8}" type="datetimeFigureOut">
               <a:rPr lang="de-DE" smtClean="0"/>
-              <a:t>30.12.2017</a:t>
+              <a:t>14.01.2018</a:t>
             </a:fld>
             <a:endParaRPr lang="de-DE"/>
           </a:p>
@@ -2785,7 +2785,7 @@
           <a:p>
             <a:fld id="{7F847C87-CECF-4A9A-88F5-87615B577ED8}" type="datetimeFigureOut">
               <a:rPr lang="de-DE" smtClean="0"/>
-              <a:t>30.12.2017</a:t>
+              <a:t>14.01.2018</a:t>
             </a:fld>
             <a:endParaRPr lang="de-DE"/>
           </a:p>
@@ -2927,8 +2927,8 @@
         <a:spcBef>
           <a:spcPts val="300"/>
         </a:spcBef>
-        <a:buFont typeface="Wingdings" panose="05000000000000000000" pitchFamily="2" charset="2"/>
-        <a:buChar char="§"/>
+        <a:buFont typeface="Calibri" panose="020F0502020204030204" pitchFamily="34" charset="0"/>
+        <a:buChar char="-"/>
         <a:defRPr lang="de-DE" sz="1000" kern="1200" baseline="0" dirty="0" smtClean="0">
           <a:solidFill>
             <a:schemeClr val="tx1"/>
@@ -12356,6 +12356,93 @@
           </a:fontRef>
         </p:style>
       </p:cxnSp>
+      <p:pic>
+        <p:nvPicPr>
+          <p:cNvPr id="31" name="Picture 2" descr="https://upload.wikimedia.org/wikipedia/commons/0/01/W3sDesign_Observer_Design_Pattern_UML.jpg"/>
+          <p:cNvPicPr>
+            <a:picLocks noChangeAspect="1" noChangeArrowheads="1"/>
+          </p:cNvPicPr>
+          <p:nvPr/>
+        </p:nvPicPr>
+        <p:blipFill>
+          <a:blip r:embed="rId2">
+            <a:extLst>
+              <a:ext uri="{28A0092B-C50C-407E-A947-70E740481C1C}">
+                <a14:useLocalDpi xmlns:a14="http://schemas.microsoft.com/office/drawing/2010/main" val="0"/>
+              </a:ext>
+            </a:extLst>
+          </a:blip>
+          <a:srcRect/>
+          <a:stretch>
+            <a:fillRect/>
+          </a:stretch>
+        </p:blipFill>
+        <p:spPr bwMode="auto">
+          <a:xfrm>
+            <a:off x="433041" y="5085184"/>
+            <a:ext cx="3888432" cy="1555373"/>
+          </a:xfrm>
+          <a:prstGeom prst="rect">
+            <a:avLst/>
+          </a:prstGeom>
+          <a:noFill/>
+          <a:extLst>
+            <a:ext uri="{909E8E84-426E-40DD-AFC4-6F175D3DCCD1}">
+              <a14:hiddenFill xmlns:a14="http://schemas.microsoft.com/office/drawing/2010/main">
+                <a:solidFill>
+                  <a:srgbClr val="FFFFFF"/>
+                </a:solidFill>
+              </a14:hiddenFill>
+            </a:ext>
+          </a:extLst>
+        </p:spPr>
+      </p:pic>
+      <p:sp>
+        <p:nvSpPr>
+          <p:cNvPr id="3" name="Rechteck 2"/>
+          <p:cNvSpPr/>
+          <p:nvPr/>
+        </p:nvSpPr>
+        <p:spPr>
+          <a:xfrm>
+            <a:off x="397228" y="4982979"/>
+            <a:ext cx="1176925" cy="246221"/>
+          </a:xfrm>
+          <a:prstGeom prst="rect">
+            <a:avLst/>
+          </a:prstGeom>
+        </p:spPr>
+        <p:txBody>
+          <a:bodyPr wrap="none">
+            <a:spAutoFit/>
+          </a:bodyPr>
+          <a:lstStyle/>
+          <a:p>
+            <a:r>
+              <a:rPr lang="de-DE" sz="1000" dirty="0">
+                <a:latin typeface="Arial" panose="020B0604020202020204" pitchFamily="34" charset="0"/>
+                <a:cs typeface="Arial" panose="020B0604020202020204" pitchFamily="34" charset="0"/>
+              </a:rPr>
+              <a:t>Observer </a:t>
+            </a:r>
+            <a:r>
+              <a:rPr lang="de-DE" sz="1000" dirty="0" err="1">
+                <a:latin typeface="Arial" panose="020B0604020202020204" pitchFamily="34" charset="0"/>
+                <a:cs typeface="Arial" panose="020B0604020202020204" pitchFamily="34" charset="0"/>
+              </a:rPr>
+              <a:t>pattern</a:t>
+            </a:r>
+            <a:r>
+              <a:rPr lang="de-DE" sz="1000" dirty="0">
+                <a:latin typeface="Arial" panose="020B0604020202020204" pitchFamily="34" charset="0"/>
+                <a:cs typeface="Arial" panose="020B0604020202020204" pitchFamily="34" charset="0"/>
+              </a:rPr>
+              <a:t> </a:t>
+            </a:r>
+            <a:endParaRPr lang="de-DE" sz="1000" dirty="0"/>
+          </a:p>
+        </p:txBody>
+      </p:sp>
     </p:spTree>
     <p:extLst>
       <p:ext uri="{BB962C8B-B14F-4D97-AF65-F5344CB8AC3E}">
@@ -12418,47 +12505,6 @@
           </a:p>
         </p:txBody>
       </p:sp>
-      <p:pic>
-        <p:nvPicPr>
-          <p:cNvPr id="1026" name="Picture 2" descr="https://upload.wikimedia.org/wikipedia/commons/0/01/W3sDesign_Observer_Design_Pattern_UML.jpg"/>
-          <p:cNvPicPr>
-            <a:picLocks noChangeAspect="1" noChangeArrowheads="1"/>
-          </p:cNvPicPr>
-          <p:nvPr/>
-        </p:nvPicPr>
-        <p:blipFill>
-          <a:blip r:embed="rId2">
-            <a:extLst>
-              <a:ext uri="{28A0092B-C50C-407E-A947-70E740481C1C}">
-                <a14:useLocalDpi xmlns:a14="http://schemas.microsoft.com/office/drawing/2010/main" val="0"/>
-              </a:ext>
-            </a:extLst>
-          </a:blip>
-          <a:srcRect/>
-          <a:stretch>
-            <a:fillRect/>
-          </a:stretch>
-        </p:blipFill>
-        <p:spPr bwMode="auto">
-          <a:xfrm>
-            <a:off x="4463990" y="1016732"/>
-            <a:ext cx="4680518" cy="1872208"/>
-          </a:xfrm>
-          <a:prstGeom prst="rect">
-            <a:avLst/>
-          </a:prstGeom>
-          <a:noFill/>
-          <a:extLst>
-            <a:ext uri="{909E8E84-426E-40DD-AFC4-6F175D3DCCD1}">
-              <a14:hiddenFill xmlns:a14="http://schemas.microsoft.com/office/drawing/2010/main">
-                <a:solidFill>
-                  <a:srgbClr val="FFFFFF"/>
-                </a:solidFill>
-              </a14:hiddenFill>
-            </a:ext>
-          </a:extLst>
-        </p:spPr>
-      </p:pic>
       <p:sp>
         <p:nvSpPr>
           <p:cNvPr id="4" name="Inhaltsplatzhalter 2"/>
@@ -12617,8 +12663,12 @@
           </a:lstStyle>
           <a:p>
             <a:r>
-              <a:rPr lang="de-DE" dirty="0" err="1" smtClean="0"/>
-              <a:t>FrameHandling</a:t>
+              <a:rPr lang="de-DE" dirty="0" smtClean="0"/>
+              <a:t>State </a:t>
+            </a:r>
+            <a:r>
+              <a:rPr lang="de-DE" dirty="0" err="1" smtClean="0"/>
+              <a:t>machine</a:t>
             </a:r>
             <a:endParaRPr lang="de-DE" dirty="0" smtClean="0"/>
           </a:p>
@@ -12628,23 +12678,16 @@
               <a:buChar char="-"/>
             </a:pPr>
             <a:r>
-              <a:rPr lang="de-DE" dirty="0" smtClean="0"/>
-              <a:t>Data</a:t>
-            </a:r>
-          </a:p>
-          <a:p>
-            <a:pPr lvl="2"/>
-            <a:r>
-              <a:rPr lang="de-DE" dirty="0" err="1" smtClean="0"/>
-              <a:t>list</a:t>
-            </a:r>
-            <a:r>
-              <a:rPr lang="de-DE" dirty="0" smtClean="0"/>
-              <a:t> </a:t>
-            </a:r>
-            <a:r>
-              <a:rPr lang="de-DE" dirty="0" err="1" smtClean="0"/>
-              <a:t>of</a:t>
+              <a:rPr lang="de-DE" dirty="0" err="1" smtClean="0"/>
+              <a:t>init</a:t>
+            </a:r>
+            <a:r>
+              <a:rPr lang="de-DE" dirty="0" smtClean="0"/>
+              <a:t> </a:t>
+            </a:r>
+            <a:r>
+              <a:rPr lang="de-DE" dirty="0" err="1" smtClean="0"/>
+              <a:t>std</a:t>
             </a:r>
             <a:r>
               <a:rPr lang="de-DE" dirty="0" smtClean="0"/>
@@ -12653,57 +12696,6 @@
             <a:r>
               <a:rPr lang="de-DE" dirty="0" err="1" smtClean="0"/>
               <a:t>parameters</a:t>
-            </a:r>
-            <a:endParaRPr lang="de-DE" dirty="0" smtClean="0"/>
-          </a:p>
-          <a:p>
-            <a:pPr lvl="2"/>
-            <a:r>
-              <a:rPr lang="de-DE" dirty="0" err="1" smtClean="0"/>
-              <a:t>framesize</a:t>
-            </a:r>
-            <a:endParaRPr lang="de-DE" dirty="0" smtClean="0"/>
-          </a:p>
-          <a:p>
-            <a:pPr lvl="2"/>
-            <a:r>
-              <a:rPr lang="de-DE" dirty="0" err="1" smtClean="0"/>
-              <a:t>region</a:t>
-            </a:r>
-            <a:r>
-              <a:rPr lang="de-DE" dirty="0" smtClean="0"/>
-              <a:t> </a:t>
-            </a:r>
-            <a:r>
-              <a:rPr lang="de-DE" dirty="0" err="1" smtClean="0"/>
-              <a:t>of</a:t>
-            </a:r>
-            <a:r>
-              <a:rPr lang="de-DE" dirty="0" smtClean="0"/>
-              <a:t> </a:t>
-            </a:r>
-            <a:r>
-              <a:rPr lang="de-DE" dirty="0" err="1" smtClean="0"/>
-              <a:t>interest</a:t>
-            </a:r>
-            <a:r>
-              <a:rPr lang="de-DE" dirty="0" smtClean="0"/>
-              <a:t> (ROI)</a:t>
-            </a:r>
-          </a:p>
-          <a:p>
-            <a:pPr lvl="2"/>
-            <a:r>
-              <a:rPr lang="de-DE" dirty="0" err="1" smtClean="0"/>
-              <a:t>frame</a:t>
-            </a:r>
-            <a:endParaRPr lang="de-DE" dirty="0" smtClean="0"/>
-          </a:p>
-          <a:p>
-            <a:pPr lvl="2"/>
-            <a:r>
-              <a:rPr lang="de-DE" dirty="0" err="1" smtClean="0"/>
-              <a:t>roi_blobs</a:t>
             </a:r>
             <a:endParaRPr lang="de-DE" dirty="0" smtClean="0"/>
           </a:p>
@@ -12714,31 +12706,381 @@
             </a:pPr>
             <a:r>
               <a:rPr lang="de-DE" dirty="0" err="1" smtClean="0"/>
-              <a:t>Functions</a:t>
+              <a:t>read</a:t>
+            </a:r>
+            <a:r>
+              <a:rPr lang="de-DE" dirty="0" smtClean="0"/>
+              <a:t> </a:t>
+            </a:r>
+            <a:r>
+              <a:rPr lang="de-DE" dirty="0" err="1" smtClean="0"/>
+              <a:t>cmd</a:t>
+            </a:r>
+            <a:r>
+              <a:rPr lang="de-DE" dirty="0" smtClean="0"/>
+              <a:t> </a:t>
+            </a:r>
+            <a:r>
+              <a:rPr lang="de-DE" dirty="0" err="1" smtClean="0"/>
+              <a:t>line</a:t>
+            </a:r>
+            <a:r>
+              <a:rPr lang="de-DE" dirty="0" smtClean="0"/>
+              <a:t> </a:t>
+            </a:r>
+            <a:r>
+              <a:rPr lang="de-DE" dirty="0" err="1" smtClean="0"/>
+              <a:t>options</a:t>
             </a:r>
             <a:endParaRPr lang="de-DE" dirty="0" smtClean="0"/>
           </a:p>
           <a:p>
+            <a:pPr lvl="1">
+              <a:buFont typeface="Arial" panose="020B0604020202020204" pitchFamily="34" charset="0"/>
+              <a:buChar char="-"/>
+            </a:pPr>
+            <a:r>
+              <a:rPr lang="de-DE" dirty="0" err="1" smtClean="0"/>
+              <a:t>read</a:t>
+            </a:r>
+            <a:r>
+              <a:rPr lang="de-DE" dirty="0" smtClean="0"/>
+              <a:t> </a:t>
+            </a:r>
+            <a:r>
+              <a:rPr lang="de-DE" dirty="0" err="1" smtClean="0"/>
+              <a:t>config</a:t>
+            </a:r>
+            <a:r>
+              <a:rPr lang="de-DE" dirty="0" smtClean="0"/>
+              <a:t> </a:t>
+            </a:r>
+            <a:r>
+              <a:rPr lang="de-DE" dirty="0" err="1" smtClean="0"/>
+              <a:t>file</a:t>
+            </a:r>
+            <a:r>
+              <a:rPr lang="de-DE" dirty="0" smtClean="0"/>
+              <a:t> / </a:t>
+            </a:r>
+            <a:r>
+              <a:rPr lang="de-DE" dirty="0" err="1" smtClean="0"/>
+              <a:t>sqlite</a:t>
+            </a:r>
+            <a:r>
+              <a:rPr lang="de-DE" dirty="0" smtClean="0"/>
+              <a:t> </a:t>
+            </a:r>
+            <a:r>
+              <a:rPr lang="de-DE" dirty="0" err="1" smtClean="0"/>
+              <a:t>db</a:t>
+            </a:r>
+            <a:r>
+              <a:rPr lang="de-DE" dirty="0" smtClean="0"/>
+              <a:t> </a:t>
+            </a:r>
+            <a:endParaRPr lang="de-DE" dirty="0"/>
+          </a:p>
+          <a:p>
+            <a:r>
+              <a:rPr lang="de-DE" dirty="0" err="1" smtClean="0"/>
+              <a:t>Cmd</a:t>
+            </a:r>
+            <a:r>
+              <a:rPr lang="de-DE" dirty="0" smtClean="0"/>
+              <a:t> </a:t>
+            </a:r>
+            <a:r>
+              <a:rPr lang="de-DE" dirty="0" err="1" smtClean="0"/>
+              <a:t>line</a:t>
+            </a:r>
+            <a:r>
+              <a:rPr lang="de-DE" dirty="0" smtClean="0"/>
+              <a:t> </a:t>
+            </a:r>
+            <a:r>
+              <a:rPr lang="de-DE" dirty="0" err="1" smtClean="0"/>
+              <a:t>options</a:t>
+            </a:r>
+            <a:r>
+              <a:rPr lang="de-DE" dirty="0" smtClean="0"/>
+              <a:t>:</a:t>
+            </a:r>
+          </a:p>
+          <a:p>
+            <a:pPr lvl="1">
+              <a:buFont typeface="Calibri" panose="020F0502020204030204" pitchFamily="34" charset="0"/>
+              <a:buChar char="-"/>
+            </a:pPr>
+            <a:r>
+              <a:rPr lang="de-DE" dirty="0" smtClean="0"/>
+              <a:t>i(</a:t>
+            </a:r>
+            <a:r>
+              <a:rPr lang="de-DE" dirty="0" err="1" smtClean="0"/>
+              <a:t>nput</a:t>
+            </a:r>
+            <a:r>
+              <a:rPr lang="de-DE" dirty="0" smtClean="0"/>
+              <a:t>)</a:t>
+            </a:r>
+          </a:p>
+          <a:p>
             <a:pPr lvl="2"/>
             <a:r>
-              <a:rPr lang="de-DE" dirty="0" err="1" smtClean="0"/>
-              <a:t>applyROI</a:t>
+              <a:rPr lang="de-DE" dirty="0" smtClean="0"/>
+              <a:t>&lt;0&gt; </a:t>
+            </a:r>
+            <a:r>
+              <a:rPr lang="de-DE" dirty="0" err="1" smtClean="0"/>
+              <a:t>video</a:t>
+            </a:r>
+            <a:r>
+              <a:rPr lang="de-DE" dirty="0" smtClean="0"/>
+              <a:t> </a:t>
+            </a:r>
+            <a:r>
+              <a:rPr lang="de-DE" dirty="0" err="1" smtClean="0"/>
+              <a:t>device</a:t>
+            </a:r>
+            <a:r>
+              <a:rPr lang="de-DE" dirty="0" smtClean="0"/>
+              <a:t> (</a:t>
+            </a:r>
+            <a:r>
+              <a:rPr lang="de-DE" dirty="0" err="1" smtClean="0"/>
+              <a:t>if</a:t>
+            </a:r>
+            <a:r>
+              <a:rPr lang="de-DE" dirty="0" smtClean="0"/>
+              <a:t> </a:t>
+            </a:r>
+            <a:r>
+              <a:rPr lang="de-DE" dirty="0" err="1" smtClean="0"/>
+              <a:t>empty</a:t>
+            </a:r>
+            <a:r>
+              <a:rPr lang="de-DE" dirty="0" smtClean="0"/>
+              <a:t>, </a:t>
+            </a:r>
+            <a:r>
+              <a:rPr lang="de-DE" dirty="0" err="1" smtClean="0"/>
+              <a:t>take</a:t>
+            </a:r>
+            <a:r>
+              <a:rPr lang="de-DE" dirty="0" smtClean="0"/>
+              <a:t> </a:t>
+            </a:r>
+            <a:r>
+              <a:rPr lang="de-DE" dirty="0" err="1" smtClean="0"/>
+              <a:t>standard</a:t>
+            </a:r>
+            <a:r>
+              <a:rPr lang="de-DE" dirty="0" smtClean="0"/>
+              <a:t> </a:t>
+            </a:r>
+            <a:r>
+              <a:rPr lang="de-DE" dirty="0" err="1" smtClean="0"/>
+              <a:t>cam</a:t>
+            </a:r>
+            <a:r>
+              <a:rPr lang="de-DE" smtClean="0"/>
+              <a:t>)</a:t>
             </a:r>
             <a:endParaRPr lang="de-DE" dirty="0" smtClean="0"/>
           </a:p>
           <a:p>
             <a:pPr lvl="2"/>
             <a:r>
-              <a:rPr lang="de-DE" dirty="0" err="1" smtClean="0"/>
-              <a:t>segmentFrame</a:t>
+              <a:rPr lang="de-DE" dirty="0" smtClean="0"/>
+              <a:t>"</a:t>
+            </a:r>
+            <a:r>
+              <a:rPr lang="de-DE" dirty="0" err="1" smtClean="0"/>
+              <a:t>input</a:t>
+            </a:r>
+            <a:r>
+              <a:rPr lang="de-DE" dirty="0" smtClean="0"/>
+              <a:t> </a:t>
+            </a:r>
+            <a:r>
+              <a:rPr lang="de-DE" dirty="0" err="1" smtClean="0"/>
+              <a:t>file</a:t>
+            </a:r>
+            <a:r>
+              <a:rPr lang="de-DE" dirty="0" smtClean="0"/>
+              <a:t>": </a:t>
+            </a:r>
+            <a:r>
+              <a:rPr lang="de-DE" dirty="0" err="1" smtClean="0"/>
+              <a:t>file</a:t>
+            </a:r>
+            <a:r>
+              <a:rPr lang="de-DE" dirty="0" smtClean="0"/>
+              <a:t> </a:t>
+            </a:r>
+            <a:r>
+              <a:rPr lang="de-DE" dirty="0" err="1" smtClean="0"/>
+              <a:t>to</a:t>
+            </a:r>
+            <a:r>
+              <a:rPr lang="de-DE" dirty="0" smtClean="0"/>
+              <a:t> </a:t>
+            </a:r>
+            <a:r>
+              <a:rPr lang="de-DE" dirty="0" err="1" smtClean="0"/>
+              <a:t>read</a:t>
+            </a:r>
+            <a:r>
+              <a:rPr lang="de-DE" dirty="0" smtClean="0"/>
+              <a:t> </a:t>
+            </a:r>
+            <a:r>
+              <a:rPr lang="de-DE" dirty="0" err="1" smtClean="0"/>
+              <a:t>from</a:t>
             </a:r>
             <a:endParaRPr lang="de-DE" dirty="0" smtClean="0"/>
           </a:p>
           <a:p>
+            <a:pPr lvl="1">
+              <a:buFont typeface="Calibri" panose="020F0502020204030204" pitchFamily="34" charset="0"/>
+              <a:buChar char="-"/>
+            </a:pPr>
+            <a:r>
+              <a:rPr lang="de-DE" dirty="0" smtClean="0"/>
+              <a:t>w(</a:t>
+            </a:r>
+            <a:r>
+              <a:rPr lang="de-DE" dirty="0" err="1" smtClean="0"/>
+              <a:t>orking</a:t>
+            </a:r>
+            <a:r>
+              <a:rPr lang="de-DE" dirty="0" smtClean="0"/>
+              <a:t> </a:t>
+            </a:r>
+            <a:r>
+              <a:rPr lang="de-DE" dirty="0" err="1" smtClean="0"/>
+              <a:t>directory</a:t>
+            </a:r>
+            <a:r>
+              <a:rPr lang="de-DE" dirty="0" smtClean="0"/>
+              <a:t>)</a:t>
+            </a:r>
+          </a:p>
+          <a:p>
+            <a:pPr lvl="2">
+              <a:buFont typeface="Calibri" panose="020F0502020204030204" pitchFamily="34" charset="0"/>
+              <a:buChar char="-"/>
+            </a:pPr>
+            <a:r>
+              <a:rPr lang="de-DE" dirty="0" smtClean="0"/>
+              <a:t>"</a:t>
+            </a:r>
+            <a:r>
+              <a:rPr lang="de-DE" dirty="0" err="1" smtClean="0"/>
+              <a:t>working</a:t>
+            </a:r>
+            <a:r>
+              <a:rPr lang="de-DE" dirty="0" smtClean="0"/>
+              <a:t> </a:t>
+            </a:r>
+            <a:r>
+              <a:rPr lang="de-DE" dirty="0" err="1" smtClean="0"/>
+              <a:t>path</a:t>
+            </a:r>
+            <a:r>
+              <a:rPr lang="de-DE" dirty="0" smtClean="0"/>
+              <a:t>" </a:t>
+            </a:r>
+            <a:r>
+              <a:rPr lang="de-DE" dirty="0" err="1" smtClean="0"/>
+              <a:t>below</a:t>
+            </a:r>
+            <a:r>
+              <a:rPr lang="de-DE" dirty="0" smtClean="0"/>
+              <a:t> </a:t>
+            </a:r>
+            <a:r>
+              <a:rPr lang="de-DE" dirty="0" err="1" smtClean="0"/>
+              <a:t>home</a:t>
+            </a:r>
+            <a:endParaRPr lang="de-DE" dirty="0" smtClean="0"/>
+          </a:p>
+          <a:p>
+            <a:pPr lvl="1">
+              <a:buFont typeface="Calibri" panose="020F0502020204030204" pitchFamily="34" charset="0"/>
+              <a:buChar char="-"/>
+            </a:pPr>
+            <a:r>
+              <a:rPr lang="de-DE" dirty="0" smtClean="0"/>
+              <a:t>o(</a:t>
+            </a:r>
+            <a:r>
+              <a:rPr lang="de-DE" dirty="0" err="1" smtClean="0"/>
+              <a:t>utput</a:t>
+            </a:r>
+            <a:r>
+              <a:rPr lang="de-DE" dirty="0" smtClean="0"/>
+              <a:t> </a:t>
+            </a:r>
+            <a:r>
+              <a:rPr lang="de-DE" dirty="0" err="1" smtClean="0"/>
+              <a:t>file</a:t>
+            </a:r>
+            <a:r>
+              <a:rPr lang="de-DE" dirty="0" smtClean="0"/>
+              <a:t>)</a:t>
+            </a:r>
+          </a:p>
+          <a:p>
             <a:pPr lvl="2"/>
             <a:r>
-              <a:rPr lang="de-DE" dirty="0" err="1" smtClean="0"/>
-              <a:t>findBlobs</a:t>
+              <a:rPr lang="de-DE" dirty="0" smtClean="0"/>
+              <a:t>"</a:t>
+            </a:r>
+            <a:r>
+              <a:rPr lang="de-DE" dirty="0" err="1" smtClean="0"/>
+              <a:t>file</a:t>
+            </a:r>
+            <a:r>
+              <a:rPr lang="de-DE" dirty="0" smtClean="0"/>
+              <a:t> </a:t>
+            </a:r>
+            <a:r>
+              <a:rPr lang="de-DE" dirty="0" err="1" smtClean="0"/>
+              <a:t>name</a:t>
+            </a:r>
+            <a:r>
+              <a:rPr lang="de-DE" dirty="0" smtClean="0"/>
+              <a:t>": </a:t>
+            </a:r>
+            <a:r>
+              <a:rPr lang="de-DE" dirty="0" err="1" smtClean="0"/>
+              <a:t>file</a:t>
+            </a:r>
+            <a:r>
+              <a:rPr lang="de-DE" dirty="0" smtClean="0"/>
+              <a:t> </a:t>
+            </a:r>
+            <a:r>
+              <a:rPr lang="de-DE" dirty="0" err="1" smtClean="0"/>
+              <a:t>to</a:t>
+            </a:r>
+            <a:r>
+              <a:rPr lang="de-DE" dirty="0" smtClean="0"/>
+              <a:t> </a:t>
+            </a:r>
+            <a:r>
+              <a:rPr lang="de-DE" dirty="0" err="1" smtClean="0"/>
+              <a:t>write</a:t>
+            </a:r>
+            <a:r>
+              <a:rPr lang="de-DE" dirty="0" smtClean="0"/>
+              <a:t> </a:t>
+            </a:r>
+            <a:r>
+              <a:rPr lang="de-DE" dirty="0" err="1" smtClean="0"/>
+              <a:t>to</a:t>
             </a:r>
             <a:endParaRPr lang="de-DE" dirty="0" smtClean="0"/>
           </a:p>
@@ -12746,12 +13088,360 @@
             <a:pPr lvl="2"/>
             <a:r>
               <a:rPr lang="de-DE" dirty="0" err="1" smtClean="0"/>
-              <a:t>showFrame</a:t>
+              <a:t>roi_blobs</a:t>
             </a:r>
             <a:endParaRPr lang="de-DE" dirty="0" smtClean="0"/>
           </a:p>
           <a:p>
+            <a:pPr lvl="1">
+              <a:buFont typeface="Arial" panose="020B0604020202020204" pitchFamily="34" charset="0"/>
+              <a:buChar char="-"/>
+            </a:pPr>
+            <a:r>
+              <a:rPr lang="de-DE" dirty="0" smtClean="0"/>
+              <a:t>r(</a:t>
+            </a:r>
+            <a:r>
+              <a:rPr lang="de-DE" dirty="0" err="1" smtClean="0"/>
+              <a:t>ate</a:t>
+            </a:r>
+            <a:r>
+              <a:rPr lang="de-DE" dirty="0" smtClean="0"/>
+              <a:t>)</a:t>
+            </a:r>
+          </a:p>
+          <a:p>
             <a:pPr lvl="2"/>
+            <a:r>
+              <a:rPr lang="de-DE" dirty="0" smtClean="0"/>
+              <a:t>&lt;</a:t>
+            </a:r>
+            <a:r>
+              <a:rPr lang="de-DE" dirty="0" err="1" smtClean="0"/>
+              <a:t>fps</a:t>
+            </a:r>
+            <a:r>
+              <a:rPr lang="de-DE" dirty="0" smtClean="0"/>
+              <a:t>&gt; </a:t>
+            </a:r>
+            <a:r>
+              <a:rPr lang="de-DE" dirty="0" err="1" smtClean="0"/>
+              <a:t>frames</a:t>
+            </a:r>
+            <a:r>
+              <a:rPr lang="de-DE" dirty="0" smtClean="0"/>
+              <a:t> per </a:t>
+            </a:r>
+            <a:r>
+              <a:rPr lang="de-DE" dirty="0" err="1" smtClean="0"/>
+              <a:t>second</a:t>
+            </a:r>
+            <a:r>
+              <a:rPr lang="de-DE" dirty="0" smtClean="0"/>
+              <a:t> </a:t>
+            </a:r>
+            <a:r>
+              <a:rPr lang="de-DE" dirty="0" err="1" smtClean="0"/>
+              <a:t>for</a:t>
+            </a:r>
+            <a:r>
+              <a:rPr lang="de-DE" dirty="0" smtClean="0"/>
+              <a:t> </a:t>
+            </a:r>
+            <a:r>
+              <a:rPr lang="de-DE" dirty="0" err="1" smtClean="0"/>
+              <a:t>video</a:t>
+            </a:r>
+            <a:r>
+              <a:rPr lang="de-DE" dirty="0" smtClean="0"/>
+              <a:t> </a:t>
+            </a:r>
+            <a:r>
+              <a:rPr lang="de-DE" dirty="0" err="1" smtClean="0"/>
+              <a:t>device</a:t>
+            </a:r>
+            <a:endParaRPr lang="de-DE" dirty="0" smtClean="0"/>
+          </a:p>
+          <a:p>
+            <a:pPr lvl="1">
+              <a:buFont typeface="Calibri" panose="020F0502020204030204" pitchFamily="34" charset="0"/>
+              <a:buChar char="-"/>
+            </a:pPr>
+            <a:r>
+              <a:rPr lang="de-DE" dirty="0" smtClean="0"/>
+              <a:t>v(</a:t>
+            </a:r>
+            <a:r>
+              <a:rPr lang="de-DE" dirty="0" err="1" smtClean="0"/>
+              <a:t>ideo</a:t>
+            </a:r>
+            <a:r>
+              <a:rPr lang="de-DE" dirty="0" smtClean="0"/>
+              <a:t> </a:t>
+            </a:r>
+            <a:r>
+              <a:rPr lang="de-DE" dirty="0" err="1" smtClean="0"/>
+              <a:t>size</a:t>
+            </a:r>
+            <a:r>
+              <a:rPr lang="de-DE" dirty="0" smtClean="0"/>
+              <a:t>)</a:t>
+            </a:r>
+          </a:p>
+          <a:p>
+            <a:pPr lvl="2">
+              <a:buFont typeface="Calibri" panose="020F0502020204030204" pitchFamily="34" charset="0"/>
+              <a:buChar char="-"/>
+            </a:pPr>
+            <a:r>
+              <a:rPr lang="de-DE" dirty="0" smtClean="0"/>
+              <a:t>&lt;320x240&gt; </a:t>
+            </a:r>
+            <a:r>
+              <a:rPr lang="de-DE" dirty="0" err="1" smtClean="0"/>
+              <a:t>frame</a:t>
+            </a:r>
+            <a:r>
+              <a:rPr lang="de-DE" dirty="0" smtClean="0"/>
+              <a:t> </a:t>
+            </a:r>
+            <a:r>
+              <a:rPr lang="de-DE" dirty="0" err="1" smtClean="0"/>
+              <a:t>size</a:t>
+            </a:r>
+            <a:endParaRPr lang="de-DE" dirty="0" smtClean="0"/>
+          </a:p>
+          <a:p>
+            <a:pPr lvl="1">
+              <a:buFont typeface="Calibri" panose="020F0502020204030204" pitchFamily="34" charset="0"/>
+              <a:buChar char="-"/>
+            </a:pPr>
+            <a:r>
+              <a:rPr lang="de-DE" dirty="0" err="1" smtClean="0"/>
+              <a:t>if</a:t>
+            </a:r>
+            <a:r>
+              <a:rPr lang="de-DE" dirty="0"/>
+              <a:t> </a:t>
+            </a:r>
+            <a:r>
+              <a:rPr lang="de-DE" dirty="0" err="1" smtClean="0"/>
+              <a:t>the</a:t>
+            </a:r>
+            <a:r>
+              <a:rPr lang="de-DE" dirty="0" smtClean="0"/>
+              <a:t> same </a:t>
+            </a:r>
+            <a:r>
+              <a:rPr lang="de-DE" dirty="0" err="1" smtClean="0"/>
+              <a:t>option</a:t>
+            </a:r>
+            <a:r>
+              <a:rPr lang="de-DE" dirty="0" smtClean="0"/>
+              <a:t> </a:t>
+            </a:r>
+            <a:r>
+              <a:rPr lang="de-DE" dirty="0" err="1" smtClean="0"/>
+              <a:t>occurs</a:t>
+            </a:r>
+            <a:r>
+              <a:rPr lang="de-DE" dirty="0" smtClean="0"/>
+              <a:t> </a:t>
+            </a:r>
+            <a:r>
+              <a:rPr lang="de-DE" dirty="0" err="1" smtClean="0"/>
+              <a:t>more</a:t>
+            </a:r>
+            <a:r>
+              <a:rPr lang="de-DE" dirty="0" smtClean="0"/>
+              <a:t> </a:t>
+            </a:r>
+            <a:r>
+              <a:rPr lang="de-DE" dirty="0" err="1" smtClean="0"/>
+              <a:t>than</a:t>
+            </a:r>
+            <a:r>
+              <a:rPr lang="de-DE" dirty="0" smtClean="0"/>
+              <a:t> </a:t>
+            </a:r>
+            <a:r>
+              <a:rPr lang="de-DE" dirty="0" err="1" smtClean="0"/>
+              <a:t>once</a:t>
+            </a:r>
+            <a:r>
+              <a:rPr lang="de-DE" dirty="0" smtClean="0"/>
+              <a:t>, </a:t>
+            </a:r>
+            <a:r>
+              <a:rPr lang="de-DE" dirty="0" err="1" smtClean="0"/>
+              <a:t>the</a:t>
+            </a:r>
+            <a:r>
+              <a:rPr lang="de-DE" dirty="0" smtClean="0"/>
+              <a:t> </a:t>
+            </a:r>
+            <a:r>
+              <a:rPr lang="de-DE" dirty="0" err="1" smtClean="0"/>
+              <a:t>first</a:t>
+            </a:r>
+            <a:r>
+              <a:rPr lang="de-DE" dirty="0" smtClean="0"/>
+              <a:t> </a:t>
+            </a:r>
+            <a:r>
+              <a:rPr lang="de-DE" dirty="0" err="1" smtClean="0"/>
+              <a:t>option</a:t>
+            </a:r>
+            <a:r>
+              <a:rPr lang="de-DE" dirty="0" smtClean="0"/>
+              <a:t> (</a:t>
+            </a:r>
+            <a:r>
+              <a:rPr lang="de-DE" dirty="0" err="1" smtClean="0"/>
+              <a:t>and</a:t>
+            </a:r>
+            <a:r>
+              <a:rPr lang="de-DE" dirty="0" smtClean="0"/>
+              <a:t> </a:t>
+            </a:r>
+            <a:r>
+              <a:rPr lang="de-DE" dirty="0" err="1" smtClean="0"/>
+              <a:t>opt</a:t>
+            </a:r>
+            <a:r>
+              <a:rPr lang="de-DE" dirty="0" smtClean="0"/>
+              <a:t> arg) </a:t>
+            </a:r>
+            <a:r>
+              <a:rPr lang="de-DE" dirty="0" err="1" smtClean="0"/>
+              <a:t>is</a:t>
+            </a:r>
+            <a:r>
+              <a:rPr lang="de-DE" dirty="0" smtClean="0"/>
+              <a:t> </a:t>
+            </a:r>
+            <a:r>
+              <a:rPr lang="de-DE" dirty="0" err="1" smtClean="0"/>
+              <a:t>taken</a:t>
+            </a:r>
+            <a:endParaRPr lang="de-DE" dirty="0" smtClean="0"/>
+          </a:p>
+          <a:p>
+            <a:pPr lvl="2">
+              <a:buFont typeface="Calibri" panose="020F0502020204030204" pitchFamily="34" charset="0"/>
+              <a:buChar char="-"/>
+            </a:pPr>
+            <a:endParaRPr lang="de-DE" dirty="0"/>
+          </a:p>
+          <a:p>
+            <a:pPr>
+              <a:buFont typeface="Calibri" panose="020F0502020204030204" pitchFamily="34" charset="0"/>
+              <a:buChar char="-"/>
+            </a:pPr>
+            <a:r>
+              <a:rPr lang="de-DE" dirty="0" err="1" smtClean="0"/>
+              <a:t>path</a:t>
+            </a:r>
+            <a:r>
+              <a:rPr lang="de-DE" dirty="0" smtClean="0"/>
+              <a:t>: </a:t>
+            </a:r>
+            <a:r>
+              <a:rPr lang="de-DE" dirty="0" err="1" smtClean="0"/>
+              <a:t>look</a:t>
+            </a:r>
+            <a:r>
+              <a:rPr lang="de-DE" dirty="0" smtClean="0"/>
+              <a:t> </a:t>
+            </a:r>
+            <a:r>
+              <a:rPr lang="de-DE" dirty="0" err="1" smtClean="0"/>
+              <a:t>for</a:t>
+            </a:r>
+            <a:r>
+              <a:rPr lang="de-DE" dirty="0" smtClean="0"/>
+              <a:t> "</a:t>
+            </a:r>
+            <a:r>
+              <a:rPr lang="de-DE" dirty="0" err="1" smtClean="0"/>
+              <a:t>input</a:t>
+            </a:r>
+            <a:r>
+              <a:rPr lang="de-DE" dirty="0" smtClean="0"/>
+              <a:t> </a:t>
+            </a:r>
+            <a:r>
+              <a:rPr lang="de-DE" dirty="0" err="1" smtClean="0"/>
+              <a:t>file</a:t>
+            </a:r>
+            <a:r>
+              <a:rPr lang="de-DE" dirty="0" smtClean="0"/>
+              <a:t>" in</a:t>
+            </a:r>
+          </a:p>
+          <a:p>
+            <a:pPr lvl="1">
+              <a:buFont typeface="Calibri" panose="020F0502020204030204" pitchFamily="34" charset="0"/>
+              <a:buChar char="-"/>
+            </a:pPr>
+            <a:r>
+              <a:rPr lang="de-DE" dirty="0" err="1" smtClean="0"/>
+              <a:t>current</a:t>
+            </a:r>
+            <a:r>
+              <a:rPr lang="de-DE" dirty="0" smtClean="0"/>
+              <a:t> </a:t>
+            </a:r>
+            <a:r>
+              <a:rPr lang="de-DE" dirty="0" err="1" smtClean="0"/>
+              <a:t>directory</a:t>
+            </a:r>
+            <a:endParaRPr lang="de-DE" dirty="0" smtClean="0"/>
+          </a:p>
+          <a:p>
+            <a:pPr lvl="1">
+              <a:buFont typeface="Calibri" panose="020F0502020204030204" pitchFamily="34" charset="0"/>
+              <a:buChar char="-"/>
+            </a:pPr>
+            <a:r>
+              <a:rPr lang="de-DE" dirty="0" smtClean="0"/>
+              <a:t>/</a:t>
+            </a:r>
+            <a:r>
+              <a:rPr lang="de-DE" dirty="0" err="1" smtClean="0"/>
+              <a:t>home</a:t>
+            </a:r>
+            <a:endParaRPr lang="de-DE" dirty="0" smtClean="0"/>
+          </a:p>
+          <a:p>
+            <a:pPr lvl="1">
+              <a:buFont typeface="Calibri" panose="020F0502020204030204" pitchFamily="34" charset="0"/>
+              <a:buChar char="-"/>
+            </a:pPr>
+            <a:r>
+              <a:rPr lang="de-DE" dirty="0" smtClean="0"/>
+              <a:t>/</a:t>
+            </a:r>
+            <a:r>
+              <a:rPr lang="de-DE" dirty="0" err="1" smtClean="0"/>
+              <a:t>home</a:t>
+            </a:r>
+            <a:r>
+              <a:rPr lang="de-DE" dirty="0" smtClean="0"/>
+              <a:t>/</a:t>
+            </a:r>
+            <a:r>
+              <a:rPr lang="de-DE" dirty="0" err="1" smtClean="0"/>
+              <a:t>working</a:t>
+            </a:r>
+            <a:r>
+              <a:rPr lang="de-DE" dirty="0" smtClean="0"/>
+              <a:t> </a:t>
+            </a:r>
+            <a:r>
+              <a:rPr lang="de-DE" dirty="0" err="1" smtClean="0"/>
+              <a:t>path</a:t>
+            </a:r>
             <a:endParaRPr lang="de-DE" dirty="0" smtClean="0"/>
           </a:p>
           <a:p>

</xml_diff>

<commit_message>
cam in basic operation, changed resolution back to config
</commit_message>
<xml_diff>
--- a/MotionDetection+ObjectTrackingV4.pptx
+++ b/MotionDetection+ObjectTrackingV4.pptx
@@ -307,7 +307,7 @@
           <a:p>
             <a:fld id="{7F847C87-CECF-4A9A-88F5-87615B577ED8}" type="datetimeFigureOut">
               <a:rPr lang="de-DE" smtClean="0"/>
-              <a:t>13.02.2018</a:t>
+              <a:t>15.04.2018</a:t>
             </a:fld>
             <a:endParaRPr lang="de-DE"/>
           </a:p>
@@ -477,7 +477,7 @@
           <a:p>
             <a:fld id="{7F847C87-CECF-4A9A-88F5-87615B577ED8}" type="datetimeFigureOut">
               <a:rPr lang="de-DE" smtClean="0"/>
-              <a:t>13.02.2018</a:t>
+              <a:t>15.04.2018</a:t>
             </a:fld>
             <a:endParaRPr lang="de-DE"/>
           </a:p>
@@ -657,7 +657,7 @@
           <a:p>
             <a:fld id="{7F847C87-CECF-4A9A-88F5-87615B577ED8}" type="datetimeFigureOut">
               <a:rPr lang="de-DE" smtClean="0"/>
-              <a:t>13.02.2018</a:t>
+              <a:t>15.04.2018</a:t>
             </a:fld>
             <a:endParaRPr lang="de-DE"/>
           </a:p>
@@ -884,7 +884,7 @@
           <a:p>
             <a:fld id="{7F847C87-CECF-4A9A-88F5-87615B577ED8}" type="datetimeFigureOut">
               <a:rPr lang="de-DE" smtClean="0"/>
-              <a:t>13.02.2018</a:t>
+              <a:t>15.04.2018</a:t>
             </a:fld>
             <a:endParaRPr lang="de-DE"/>
           </a:p>
@@ -1137,7 +1137,7 @@
           <a:p>
             <a:fld id="{7F847C87-CECF-4A9A-88F5-87615B577ED8}" type="datetimeFigureOut">
               <a:rPr lang="de-DE" smtClean="0"/>
-              <a:t>13.02.2018</a:t>
+              <a:t>15.04.2018</a:t>
             </a:fld>
             <a:endParaRPr lang="de-DE"/>
           </a:p>
@@ -1425,7 +1425,7 @@
           <a:p>
             <a:fld id="{7F847C87-CECF-4A9A-88F5-87615B577ED8}" type="datetimeFigureOut">
               <a:rPr lang="de-DE" smtClean="0"/>
-              <a:t>13.02.2018</a:t>
+              <a:t>15.04.2018</a:t>
             </a:fld>
             <a:endParaRPr lang="de-DE"/>
           </a:p>
@@ -1847,7 +1847,7 @@
           <a:p>
             <a:fld id="{7F847C87-CECF-4A9A-88F5-87615B577ED8}" type="datetimeFigureOut">
               <a:rPr lang="de-DE" smtClean="0"/>
-              <a:t>13.02.2018</a:t>
+              <a:t>15.04.2018</a:t>
             </a:fld>
             <a:endParaRPr lang="de-DE"/>
           </a:p>
@@ -1965,7 +1965,7 @@
           <a:p>
             <a:fld id="{7F847C87-CECF-4A9A-88F5-87615B577ED8}" type="datetimeFigureOut">
               <a:rPr lang="de-DE" smtClean="0"/>
-              <a:t>13.02.2018</a:t>
+              <a:t>15.04.2018</a:t>
             </a:fld>
             <a:endParaRPr lang="de-DE"/>
           </a:p>
@@ -2060,7 +2060,7 @@
           <a:p>
             <a:fld id="{7F847C87-CECF-4A9A-88F5-87615B577ED8}" type="datetimeFigureOut">
               <a:rPr lang="de-DE" smtClean="0"/>
-              <a:t>13.02.2018</a:t>
+              <a:t>15.04.2018</a:t>
             </a:fld>
             <a:endParaRPr lang="de-DE"/>
           </a:p>
@@ -2337,7 +2337,7 @@
           <a:p>
             <a:fld id="{7F847C87-CECF-4A9A-88F5-87615B577ED8}" type="datetimeFigureOut">
               <a:rPr lang="de-DE" smtClean="0"/>
-              <a:t>13.02.2018</a:t>
+              <a:t>15.04.2018</a:t>
             </a:fld>
             <a:endParaRPr lang="de-DE"/>
           </a:p>
@@ -2590,7 +2590,7 @@
           <a:p>
             <a:fld id="{7F847C87-CECF-4A9A-88F5-87615B577ED8}" type="datetimeFigureOut">
               <a:rPr lang="de-DE" smtClean="0"/>
-              <a:t>13.02.2018</a:t>
+              <a:t>15.04.2018</a:t>
             </a:fld>
             <a:endParaRPr lang="de-DE"/>
           </a:p>
@@ -2788,7 +2788,7 @@
           <a:p>
             <a:fld id="{7F847C87-CECF-4A9A-88F5-87615B577ED8}" type="datetimeFigureOut">
               <a:rPr lang="de-DE" smtClean="0"/>
-              <a:t>13.02.2018</a:t>
+              <a:t>15.04.2018</a:t>
             </a:fld>
             <a:endParaRPr lang="de-DE"/>
           </a:p>
@@ -19099,11 +19099,7 @@
             </a:r>
             <a:r>
               <a:rPr lang="de-DE" dirty="0" err="1" smtClean="0"/>
-              <a:t>is</a:t>
-            </a:r>
-            <a:r>
-              <a:rPr lang="de-DE" dirty="0" err="1" smtClean="0"/>
-              <a:t>Camera</a:t>
+              <a:t>isCamera</a:t>
             </a:r>
             <a:r>
               <a:rPr lang="de-DE" dirty="0" smtClean="0"/>
@@ -19162,11 +19158,7 @@
             </a:r>
             <a:r>
               <a:rPr lang="de-DE" dirty="0" err="1" smtClean="0"/>
-              <a:t>is</a:t>
-            </a:r>
-            <a:r>
-              <a:rPr lang="de-DE" dirty="0" err="1" smtClean="0"/>
-              <a:t>File</a:t>
+              <a:t>isFile</a:t>
             </a:r>
             <a:r>
               <a:rPr lang="de-DE" dirty="0" smtClean="0"/>
@@ -19197,7 +19189,7 @@
           <a:p>
             <a:pPr lvl="1"/>
             <a:r>
-              <a:rPr lang="de-DE" smtClean="0"/>
+              <a:rPr lang="de-DE" dirty="0" err="1" smtClean="0"/>
               <a:t>saveConfigToFile</a:t>
             </a:r>
             <a:endParaRPr lang="de-DE" dirty="0"/>
@@ -19249,25 +19241,196 @@
           <a:p>
             <a:pPr lvl="2"/>
             <a:r>
-              <a:rPr lang="de-DE" dirty="0" smtClean="0"/>
-              <a:t>&lt;0&gt; </a:t>
-            </a:r>
-            <a:r>
-              <a:rPr lang="de-DE" dirty="0" err="1" smtClean="0"/>
+              <a:rPr lang="de-DE" dirty="0" smtClean="0">
+                <a:solidFill>
+                  <a:srgbClr val="FF0000"/>
+                </a:solidFill>
+              </a:rPr>
+              <a:t>arg: "0" </a:t>
+            </a:r>
+            <a:r>
+              <a:rPr lang="de-DE" dirty="0" err="1" smtClean="0">
+                <a:solidFill>
+                  <a:srgbClr val="FF0000"/>
+                </a:solidFill>
+              </a:rPr>
               <a:t>video</a:t>
             </a:r>
             <a:r>
-              <a:rPr lang="de-DE" dirty="0" smtClean="0"/>
-              <a:t> </a:t>
-            </a:r>
-            <a:r>
-              <a:rPr lang="de-DE" dirty="0" err="1" smtClean="0"/>
+              <a:rPr lang="de-DE" dirty="0" smtClean="0">
+                <a:solidFill>
+                  <a:srgbClr val="FF0000"/>
+                </a:solidFill>
+              </a:rPr>
+              <a:t> </a:t>
+            </a:r>
+            <a:r>
+              <a:rPr lang="de-DE" dirty="0" err="1" smtClean="0">
+                <a:solidFill>
+                  <a:srgbClr val="FF0000"/>
+                </a:solidFill>
+              </a:rPr>
               <a:t>device</a:t>
             </a:r>
             <a:r>
-              <a:rPr lang="de-DE" dirty="0" smtClean="0"/>
-              <a:t> (</a:t>
-            </a:r>
+              <a:rPr lang="de-DE" dirty="0" smtClean="0">
+                <a:solidFill>
+                  <a:srgbClr val="FF0000"/>
+                </a:solidFill>
+              </a:rPr>
+              <a:t> - </a:t>
+            </a:r>
+            <a:r>
+              <a:rPr lang="de-DE" dirty="0" err="1" smtClean="0">
+                <a:solidFill>
+                  <a:srgbClr val="FF0000"/>
+                </a:solidFill>
+              </a:rPr>
+              <a:t>number</a:t>
+            </a:r>
+            <a:r>
+              <a:rPr lang="de-DE" dirty="0" smtClean="0">
+                <a:solidFill>
+                  <a:srgbClr val="FF0000"/>
+                </a:solidFill>
+              </a:rPr>
+              <a:t> </a:t>
+            </a:r>
+            <a:r>
+              <a:rPr lang="de-DE" dirty="0" err="1" smtClean="0">
+                <a:solidFill>
+                  <a:srgbClr val="FF0000"/>
+                </a:solidFill>
+              </a:rPr>
+              <a:t>of</a:t>
+            </a:r>
+            <a:r>
+              <a:rPr lang="de-DE" dirty="0" smtClean="0">
+                <a:solidFill>
+                  <a:srgbClr val="FF0000"/>
+                </a:solidFill>
+              </a:rPr>
+              <a:t> </a:t>
+            </a:r>
+            <a:r>
+              <a:rPr lang="de-DE" dirty="0" err="1" smtClean="0">
+                <a:solidFill>
+                  <a:srgbClr val="FF0000"/>
+                </a:solidFill>
+              </a:rPr>
+              <a:t>device</a:t>
+            </a:r>
+            <a:r>
+              <a:rPr lang="de-DE" dirty="0" smtClean="0">
+                <a:solidFill>
+                  <a:srgbClr val="FF0000"/>
+                </a:solidFill>
+              </a:rPr>
+              <a:t> in pick </a:t>
+            </a:r>
+            <a:r>
+              <a:rPr lang="de-DE" dirty="0" err="1" smtClean="0">
+                <a:solidFill>
+                  <a:srgbClr val="FF0000"/>
+                </a:solidFill>
+              </a:rPr>
+              <a:t>list</a:t>
+            </a:r>
+            <a:r>
+              <a:rPr lang="de-DE" dirty="0" smtClean="0">
+                <a:solidFill>
+                  <a:srgbClr val="FF0000"/>
+                </a:solidFill>
+              </a:rPr>
+              <a:t>, </a:t>
+            </a:r>
+            <a:r>
+              <a:rPr lang="de-DE" dirty="0" smtClean="0">
+                <a:solidFill>
+                  <a:srgbClr val="FF0000"/>
+                </a:solidFill>
+              </a:rPr>
+              <a:t>e.g</a:t>
+            </a:r>
+            <a:r>
+              <a:rPr lang="de-DE" dirty="0" smtClean="0">
+                <a:solidFill>
+                  <a:srgbClr val="FF0000"/>
+                </a:solidFill>
+              </a:rPr>
+              <a:t>. 0 -&gt; "</a:t>
+            </a:r>
+            <a:r>
+              <a:rPr lang="de-DE" dirty="0" err="1" smtClean="0">
+                <a:solidFill>
+                  <a:srgbClr val="FF0000"/>
+                </a:solidFill>
+              </a:rPr>
+              <a:t>logitech</a:t>
+            </a:r>
+            <a:r>
+              <a:rPr lang="de-DE" dirty="0" smtClean="0">
+                <a:solidFill>
+                  <a:srgbClr val="FF0000"/>
+                </a:solidFill>
+              </a:rPr>
+              <a:t> S5500"</a:t>
+            </a:r>
+          </a:p>
+          <a:p>
+            <a:pPr lvl="2"/>
+            <a:r>
+              <a:rPr lang="de-DE" dirty="0" smtClean="0"/>
+              <a:t>arg: "</a:t>
+            </a:r>
+            <a:r>
+              <a:rPr lang="de-DE" dirty="0" err="1" smtClean="0"/>
+              <a:t>input</a:t>
+            </a:r>
+            <a:r>
+              <a:rPr lang="de-DE" dirty="0" smtClean="0"/>
+              <a:t> </a:t>
+            </a:r>
+            <a:r>
+              <a:rPr lang="de-DE" dirty="0" err="1"/>
+              <a:t>file</a:t>
+            </a:r>
+            <a:r>
+              <a:rPr lang="de-DE" dirty="0"/>
+              <a:t>": </a:t>
+            </a:r>
+            <a:r>
+              <a:rPr lang="de-DE" dirty="0" err="1"/>
+              <a:t>file</a:t>
+            </a:r>
+            <a:r>
+              <a:rPr lang="de-DE" dirty="0"/>
+              <a:t> </a:t>
+            </a:r>
+            <a:r>
+              <a:rPr lang="de-DE" dirty="0" err="1"/>
+              <a:t>to</a:t>
+            </a:r>
+            <a:r>
+              <a:rPr lang="de-DE" dirty="0"/>
+              <a:t> </a:t>
+            </a:r>
+            <a:r>
+              <a:rPr lang="de-DE" dirty="0" err="1"/>
+              <a:t>read</a:t>
+            </a:r>
+            <a:r>
+              <a:rPr lang="de-DE" dirty="0"/>
+              <a:t> </a:t>
+            </a:r>
+            <a:r>
+              <a:rPr lang="de-DE" dirty="0" err="1"/>
+              <a:t>from</a:t>
+            </a:r>
+            <a:endParaRPr lang="de-DE" dirty="0"/>
+          </a:p>
+          <a:p>
+            <a:pPr lvl="2"/>
             <a:r>
               <a:rPr lang="de-DE" dirty="0" err="1" smtClean="0"/>
               <a:t>if</a:t>
@@ -19303,61 +19466,6 @@
             <a:r>
               <a:rPr lang="de-DE" dirty="0" err="1" smtClean="0"/>
               <a:t>cam</a:t>
-            </a:r>
-            <a:r>
-              <a:rPr lang="de-DE" dirty="0" smtClean="0"/>
-              <a:t>)</a:t>
-            </a:r>
-          </a:p>
-          <a:p>
-            <a:pPr lvl="2"/>
-            <a:r>
-              <a:rPr lang="de-DE" dirty="0" smtClean="0"/>
-              <a:t>"</a:t>
-            </a:r>
-            <a:r>
-              <a:rPr lang="de-DE" dirty="0" err="1" smtClean="0"/>
-              <a:t>input</a:t>
-            </a:r>
-            <a:r>
-              <a:rPr lang="de-DE" dirty="0" smtClean="0"/>
-              <a:t> </a:t>
-            </a:r>
-            <a:r>
-              <a:rPr lang="de-DE" dirty="0" err="1" smtClean="0"/>
-              <a:t>file</a:t>
-            </a:r>
-            <a:r>
-              <a:rPr lang="de-DE" dirty="0" smtClean="0"/>
-              <a:t>": </a:t>
-            </a:r>
-            <a:r>
-              <a:rPr lang="de-DE" dirty="0" err="1" smtClean="0"/>
-              <a:t>file</a:t>
-            </a:r>
-            <a:r>
-              <a:rPr lang="de-DE" dirty="0" smtClean="0"/>
-              <a:t> </a:t>
-            </a:r>
-            <a:r>
-              <a:rPr lang="de-DE" dirty="0" err="1" smtClean="0"/>
-              <a:t>to</a:t>
-            </a:r>
-            <a:r>
-              <a:rPr lang="de-DE" dirty="0" smtClean="0"/>
-              <a:t> </a:t>
-            </a:r>
-            <a:r>
-              <a:rPr lang="de-DE" dirty="0" err="1" smtClean="0"/>
-              <a:t>read</a:t>
-            </a:r>
-            <a:r>
-              <a:rPr lang="de-DE" dirty="0" smtClean="0"/>
-              <a:t> </a:t>
-            </a:r>
-            <a:r>
-              <a:rPr lang="de-DE" dirty="0" err="1" smtClean="0"/>
-              <a:t>from</a:t>
             </a:r>
             <a:endParaRPr lang="de-DE" dirty="0" smtClean="0"/>
           </a:p>
@@ -19394,7 +19502,7 @@
             </a:pPr>
             <a:r>
               <a:rPr lang="de-DE" dirty="0" smtClean="0"/>
-              <a:t>"</a:t>
+              <a:t>arg: "</a:t>
             </a:r>
             <a:r>
               <a:rPr lang="de-DE" dirty="0" err="1" smtClean="0"/>
@@ -19456,7 +19564,7 @@
             <a:pPr lvl="2"/>
             <a:r>
               <a:rPr lang="de-DE" dirty="0" smtClean="0"/>
-              <a:t>"</a:t>
+              <a:t>arg: "</a:t>
             </a:r>
             <a:r>
               <a:rPr lang="de-DE" dirty="0" err="1" smtClean="0"/>
@@ -19501,14 +19609,6 @@
             <a:r>
               <a:rPr lang="de-DE" dirty="0" err="1" smtClean="0"/>
               <a:t>to</a:t>
-            </a:r>
-            <a:endParaRPr lang="de-DE" dirty="0" smtClean="0"/>
-          </a:p>
-          <a:p>
-            <a:pPr lvl="2"/>
-            <a:r>
-              <a:rPr lang="de-DE" dirty="0" err="1" smtClean="0"/>
-              <a:t>roi_blobs</a:t>
             </a:r>
             <a:endParaRPr lang="de-DE" dirty="0" smtClean="0"/>
           </a:p>
@@ -19518,6 +19618,228 @@
               <a:buChar char="-"/>
             </a:pPr>
             <a:r>
+              <a:rPr lang="de-DE" dirty="0" smtClean="0">
+                <a:solidFill>
+                  <a:srgbClr val="FF0000"/>
+                </a:solidFill>
+              </a:rPr>
+              <a:t>q(</a:t>
+            </a:r>
+            <a:r>
+              <a:rPr lang="de-DE" dirty="0" err="1" smtClean="0">
+                <a:solidFill>
+                  <a:srgbClr val="FF0000"/>
+                </a:solidFill>
+              </a:rPr>
+              <a:t>uiet</a:t>
+            </a:r>
+            <a:r>
+              <a:rPr lang="de-DE" dirty="0" smtClean="0">
+                <a:solidFill>
+                  <a:srgbClr val="FF0000"/>
+                </a:solidFill>
+              </a:rPr>
+              <a:t>)</a:t>
+            </a:r>
+          </a:p>
+          <a:p>
+            <a:pPr lvl="2"/>
+            <a:r>
+              <a:rPr lang="de-DE" dirty="0" err="1" smtClean="0">
+                <a:solidFill>
+                  <a:srgbClr val="FF0000"/>
+                </a:solidFill>
+              </a:rPr>
+              <a:t>no</a:t>
+            </a:r>
+            <a:r>
+              <a:rPr lang="de-DE" dirty="0" smtClean="0">
+                <a:solidFill>
+                  <a:srgbClr val="FF0000"/>
+                </a:solidFill>
+              </a:rPr>
+              <a:t> arg, </a:t>
+            </a:r>
+            <a:r>
+              <a:rPr lang="de-DE" dirty="0" err="1" smtClean="0">
+                <a:solidFill>
+                  <a:srgbClr val="FF0000"/>
+                </a:solidFill>
+              </a:rPr>
+              <a:t>take</a:t>
+            </a:r>
+            <a:r>
+              <a:rPr lang="de-DE" dirty="0" smtClean="0">
+                <a:solidFill>
+                  <a:srgbClr val="FF0000"/>
+                </a:solidFill>
+              </a:rPr>
+              <a:t> </a:t>
+            </a:r>
+            <a:r>
+              <a:rPr lang="de-DE" dirty="0" err="1" smtClean="0">
+                <a:solidFill>
+                  <a:srgbClr val="FF0000"/>
+                </a:solidFill>
+              </a:rPr>
+              <a:t>standard</a:t>
+            </a:r>
+            <a:r>
+              <a:rPr lang="de-DE" dirty="0" smtClean="0">
+                <a:solidFill>
+                  <a:srgbClr val="FF0000"/>
+                </a:solidFill>
+              </a:rPr>
+              <a:t> </a:t>
+            </a:r>
+            <a:r>
+              <a:rPr lang="de-DE" dirty="0" err="1" smtClean="0">
+                <a:solidFill>
+                  <a:srgbClr val="FF0000"/>
+                </a:solidFill>
+              </a:rPr>
+              <a:t>arguments</a:t>
+            </a:r>
+            <a:r>
+              <a:rPr lang="de-DE" dirty="0" smtClean="0">
+                <a:solidFill>
+                  <a:srgbClr val="FF0000"/>
+                </a:solidFill>
+              </a:rPr>
+              <a:t> </a:t>
+            </a:r>
+            <a:r>
+              <a:rPr lang="de-DE" dirty="0" err="1" smtClean="0">
+                <a:solidFill>
+                  <a:srgbClr val="FF0000"/>
+                </a:solidFill>
+              </a:rPr>
+              <a:t>without</a:t>
+            </a:r>
+            <a:r>
+              <a:rPr lang="de-DE" dirty="0" smtClean="0">
+                <a:solidFill>
+                  <a:srgbClr val="FF0000"/>
+                </a:solidFill>
+              </a:rPr>
+              <a:t> </a:t>
+            </a:r>
+            <a:r>
+              <a:rPr lang="de-DE" dirty="0" err="1" smtClean="0">
+                <a:solidFill>
+                  <a:srgbClr val="FF0000"/>
+                </a:solidFill>
+              </a:rPr>
+              <a:t>asking</a:t>
+            </a:r>
+            <a:r>
+              <a:rPr lang="de-DE" dirty="0" smtClean="0">
+                <a:solidFill>
+                  <a:srgbClr val="FF0000"/>
+                </a:solidFill>
+              </a:rPr>
+              <a:t> </a:t>
+            </a:r>
+            <a:r>
+              <a:rPr lang="de-DE" dirty="0" err="1" smtClean="0">
+                <a:solidFill>
+                  <a:srgbClr val="FF0000"/>
+                </a:solidFill>
+              </a:rPr>
+              <a:t>for</a:t>
+            </a:r>
+            <a:r>
+              <a:rPr lang="de-DE" dirty="0" smtClean="0">
+                <a:solidFill>
+                  <a:srgbClr val="FF0000"/>
+                </a:solidFill>
+              </a:rPr>
+              <a:t> </a:t>
+            </a:r>
+            <a:r>
+              <a:rPr lang="de-DE" dirty="0" err="1" smtClean="0">
+                <a:solidFill>
+                  <a:srgbClr val="FF0000"/>
+                </a:solidFill>
+              </a:rPr>
+              <a:t>user</a:t>
+            </a:r>
+            <a:r>
+              <a:rPr lang="de-DE" dirty="0" smtClean="0">
+                <a:solidFill>
+                  <a:srgbClr val="FF0000"/>
+                </a:solidFill>
+              </a:rPr>
+              <a:t> </a:t>
+            </a:r>
+            <a:r>
+              <a:rPr lang="de-DE" dirty="0" err="1" smtClean="0">
+                <a:solidFill>
+                  <a:srgbClr val="FF0000"/>
+                </a:solidFill>
+              </a:rPr>
+              <a:t>input</a:t>
+            </a:r>
+            <a:r>
+              <a:rPr lang="de-DE" dirty="0" smtClean="0">
+                <a:solidFill>
+                  <a:srgbClr val="FF0000"/>
+                </a:solidFill>
+              </a:rPr>
+              <a:t>, e.g. </a:t>
+            </a:r>
+            <a:r>
+              <a:rPr lang="de-DE" dirty="0" err="1" smtClean="0">
+                <a:solidFill>
+                  <a:srgbClr val="FF0000"/>
+                </a:solidFill>
+              </a:rPr>
+              <a:t>pre-selected</a:t>
+            </a:r>
+            <a:r>
+              <a:rPr lang="de-DE" dirty="0" smtClean="0">
+                <a:solidFill>
+                  <a:srgbClr val="FF0000"/>
+                </a:solidFill>
+              </a:rPr>
+              <a:t> </a:t>
+            </a:r>
+            <a:r>
+              <a:rPr lang="de-DE" dirty="0" err="1" smtClean="0">
+                <a:solidFill>
+                  <a:srgbClr val="FF0000"/>
+                </a:solidFill>
+              </a:rPr>
+              <a:t>items</a:t>
+            </a:r>
+            <a:r>
+              <a:rPr lang="de-DE" dirty="0" smtClean="0">
+                <a:solidFill>
+                  <a:srgbClr val="FF0000"/>
+                </a:solidFill>
+              </a:rPr>
+              <a:t> in pick </a:t>
+            </a:r>
+            <a:r>
+              <a:rPr lang="de-DE" dirty="0" err="1" smtClean="0">
+                <a:solidFill>
+                  <a:srgbClr val="FF0000"/>
+                </a:solidFill>
+              </a:rPr>
+              <a:t>lists</a:t>
+            </a:r>
+            <a:endParaRPr lang="de-DE" dirty="0" smtClean="0">
+              <a:solidFill>
+                <a:srgbClr val="FF0000"/>
+              </a:solidFill>
+            </a:endParaRPr>
+          </a:p>
+          <a:p>
+            <a:pPr lvl="1">
+              <a:buFont typeface="Arial" panose="020B0604020202020204" pitchFamily="34" charset="0"/>
+              <a:buChar char="-"/>
+            </a:pPr>
+            <a:r>
               <a:rPr lang="de-DE" dirty="0" smtClean="0"/>
               <a:t>r(</a:t>
             </a:r>
@@ -19533,8 +19855,48 @@
           <a:p>
             <a:pPr lvl="2"/>
             <a:r>
-              <a:rPr lang="de-DE" dirty="0" smtClean="0"/>
-              <a:t>&lt;</a:t>
+              <a:rPr lang="de-DE" dirty="0" smtClean="0">
+                <a:solidFill>
+                  <a:srgbClr val="FF0000"/>
+                </a:solidFill>
+              </a:rPr>
+              <a:t>not </a:t>
+            </a:r>
+            <a:r>
+              <a:rPr lang="de-DE" dirty="0" err="1" smtClean="0">
+                <a:solidFill>
+                  <a:srgbClr val="FF0000"/>
+                </a:solidFill>
+              </a:rPr>
+              <a:t>yet</a:t>
+            </a:r>
+            <a:r>
+              <a:rPr lang="de-DE" dirty="0" smtClean="0">
+                <a:solidFill>
+                  <a:srgbClr val="FF0000"/>
+                </a:solidFill>
+              </a:rPr>
+              <a:t> </a:t>
+            </a:r>
+            <a:r>
+              <a:rPr lang="de-DE" dirty="0" err="1" smtClean="0">
+                <a:solidFill>
+                  <a:srgbClr val="FF0000"/>
+                </a:solidFill>
+              </a:rPr>
+              <a:t>implemented</a:t>
+            </a:r>
+            <a:endParaRPr lang="de-DE" dirty="0" smtClean="0">
+              <a:solidFill>
+                <a:srgbClr val="FF0000"/>
+              </a:solidFill>
+            </a:endParaRPr>
+          </a:p>
+          <a:p>
+            <a:pPr lvl="2"/>
+            <a:r>
+              <a:rPr lang="de-DE" dirty="0" smtClean="0"/>
+              <a:t>arg: "</a:t>
             </a:r>
             <a:r>
               <a:rPr lang="de-DE" dirty="0" err="1" smtClean="0"/>
@@ -19542,7 +19904,7 @@
             </a:r>
             <a:r>
               <a:rPr lang="de-DE" dirty="0" smtClean="0"/>
-              <a:t>&gt; </a:t>
+              <a:t>" </a:t>
             </a:r>
             <a:r>
               <a:rPr lang="de-DE" dirty="0" err="1" smtClean="0"/>
@@ -19614,22 +19976,125 @@
               <a:buChar char="-"/>
             </a:pPr>
             <a:r>
-              <a:rPr lang="de-DE" dirty="0" smtClean="0"/>
-              <a:t>&lt;320x240&gt; </a:t>
-            </a:r>
-            <a:r>
-              <a:rPr lang="de-DE" dirty="0" err="1" smtClean="0"/>
+              <a:rPr lang="de-DE" smtClean="0">
+                <a:solidFill>
+                  <a:srgbClr val="FF0000"/>
+                </a:solidFill>
+              </a:rPr>
+              <a:t>arg: "0" </a:t>
+            </a:r>
+            <a:r>
+              <a:rPr lang="de-DE" dirty="0" err="1" smtClean="0">
+                <a:solidFill>
+                  <a:srgbClr val="FF0000"/>
+                </a:solidFill>
+              </a:rPr>
               <a:t>frame</a:t>
             </a:r>
             <a:r>
-              <a:rPr lang="de-DE" dirty="0" smtClean="0"/>
-              <a:t> </a:t>
-            </a:r>
-            <a:r>
-              <a:rPr lang="de-DE" dirty="0" err="1" smtClean="0"/>
+              <a:rPr lang="de-DE" dirty="0" smtClean="0">
+                <a:solidFill>
+                  <a:srgbClr val="FF0000"/>
+                </a:solidFill>
+              </a:rPr>
+              <a:t> </a:t>
+            </a:r>
+            <a:r>
+              <a:rPr lang="de-DE" dirty="0" err="1" smtClean="0">
+                <a:solidFill>
+                  <a:srgbClr val="FF0000"/>
+                </a:solidFill>
+              </a:rPr>
               <a:t>size</a:t>
             </a:r>
-            <a:endParaRPr lang="de-DE" dirty="0" smtClean="0"/>
+            <a:r>
+              <a:rPr lang="de-DE" dirty="0" smtClean="0">
+                <a:solidFill>
+                  <a:srgbClr val="FF0000"/>
+                </a:solidFill>
+              </a:rPr>
+              <a:t> - </a:t>
+            </a:r>
+            <a:r>
+              <a:rPr lang="de-DE" dirty="0" err="1" smtClean="0">
+                <a:solidFill>
+                  <a:srgbClr val="FF0000"/>
+                </a:solidFill>
+              </a:rPr>
+              <a:t>number</a:t>
+            </a:r>
+            <a:r>
+              <a:rPr lang="de-DE" dirty="0" smtClean="0">
+                <a:solidFill>
+                  <a:srgbClr val="FF0000"/>
+                </a:solidFill>
+              </a:rPr>
+              <a:t> </a:t>
+            </a:r>
+            <a:r>
+              <a:rPr lang="de-DE" dirty="0" err="1" smtClean="0">
+                <a:solidFill>
+                  <a:srgbClr val="FF0000"/>
+                </a:solidFill>
+              </a:rPr>
+              <a:t>of</a:t>
+            </a:r>
+            <a:r>
+              <a:rPr lang="de-DE" dirty="0" smtClean="0">
+                <a:solidFill>
+                  <a:srgbClr val="FF0000"/>
+                </a:solidFill>
+              </a:rPr>
+              <a:t> </a:t>
+            </a:r>
+            <a:r>
+              <a:rPr lang="de-DE" dirty="0" err="1" smtClean="0">
+                <a:solidFill>
+                  <a:srgbClr val="FF0000"/>
+                </a:solidFill>
+              </a:rPr>
+              <a:t>size</a:t>
+            </a:r>
+            <a:r>
+              <a:rPr lang="de-DE" dirty="0" smtClean="0">
+                <a:solidFill>
+                  <a:srgbClr val="FF0000"/>
+                </a:solidFill>
+              </a:rPr>
+              <a:t> in </a:t>
+            </a:r>
+            <a:r>
+              <a:rPr lang="de-DE" dirty="0" err="1" smtClean="0">
+                <a:solidFill>
+                  <a:srgbClr val="FF0000"/>
+                </a:solidFill>
+              </a:rPr>
+              <a:t>pick_list</a:t>
+            </a:r>
+            <a:r>
+              <a:rPr lang="de-DE" dirty="0" smtClean="0">
+                <a:solidFill>
+                  <a:srgbClr val="FF0000"/>
+                </a:solidFill>
+              </a:rPr>
+              <a:t> (e.g. </a:t>
+            </a:r>
+            <a:r>
+              <a:rPr lang="de-DE" dirty="0">
+                <a:solidFill>
+                  <a:srgbClr val="FF0000"/>
+                </a:solidFill>
+              </a:rPr>
+              <a:t>0 </a:t>
+            </a:r>
+            <a:r>
+              <a:rPr lang="de-DE" dirty="0" smtClean="0">
+                <a:solidFill>
+                  <a:srgbClr val="FF0000"/>
+                </a:solidFill>
+              </a:rPr>
+              <a:t>-&gt; 320x240)</a:t>
+            </a:r>
           </a:p>
           <a:p>
             <a:pPr lvl="1">

</xml_diff>

<commit_message>
inset text and resizing OK
</commit_message>
<xml_diff>
--- a/MotionDetection+ObjectTrackingV4.pptx
+++ b/MotionDetection+ObjectTrackingV4.pptx
@@ -310,7 +310,7 @@
           <a:p>
             <a:fld id="{7F847C87-CECF-4A9A-88F5-87615B577ED8}" type="datetimeFigureOut">
               <a:rPr lang="de-DE" smtClean="0"/>
-              <a:t>28.05.2018</a:t>
+              <a:t>02.06.2018</a:t>
             </a:fld>
             <a:endParaRPr lang="de-DE"/>
           </a:p>
@@ -489,7 +489,7 @@
           <a:p>
             <a:fld id="{7F847C87-CECF-4A9A-88F5-87615B577ED8}" type="datetimeFigureOut">
               <a:rPr lang="de-DE" smtClean="0"/>
-              <a:t>28.05.2018</a:t>
+              <a:t>02.06.2018</a:t>
             </a:fld>
             <a:endParaRPr lang="de-DE"/>
           </a:p>
@@ -669,7 +669,7 @@
           <a:p>
             <a:fld id="{7F847C87-CECF-4A9A-88F5-87615B577ED8}" type="datetimeFigureOut">
               <a:rPr lang="de-DE" smtClean="0"/>
-              <a:t>28.05.2018</a:t>
+              <a:t>02.06.2018</a:t>
             </a:fld>
             <a:endParaRPr lang="de-DE"/>
           </a:p>
@@ -903,7 +903,7 @@
           <a:p>
             <a:fld id="{7F847C87-CECF-4A9A-88F5-87615B577ED8}" type="datetimeFigureOut">
               <a:rPr lang="de-DE" smtClean="0"/>
-              <a:t>28.05.2018</a:t>
+              <a:t>02.06.2018</a:t>
             </a:fld>
             <a:endParaRPr lang="de-DE"/>
           </a:p>
@@ -1156,7 +1156,7 @@
           <a:p>
             <a:fld id="{7F847C87-CECF-4A9A-88F5-87615B577ED8}" type="datetimeFigureOut">
               <a:rPr lang="de-DE" smtClean="0"/>
-              <a:t>28.05.2018</a:t>
+              <a:t>02.06.2018</a:t>
             </a:fld>
             <a:endParaRPr lang="de-DE"/>
           </a:p>
@@ -1444,7 +1444,7 @@
           <a:p>
             <a:fld id="{7F847C87-CECF-4A9A-88F5-87615B577ED8}" type="datetimeFigureOut">
               <a:rPr lang="de-DE" smtClean="0"/>
-              <a:t>28.05.2018</a:t>
+              <a:t>02.06.2018</a:t>
             </a:fld>
             <a:endParaRPr lang="de-DE"/>
           </a:p>
@@ -1866,7 +1866,7 @@
           <a:p>
             <a:fld id="{7F847C87-CECF-4A9A-88F5-87615B577ED8}" type="datetimeFigureOut">
               <a:rPr lang="de-DE" smtClean="0"/>
-              <a:t>28.05.2018</a:t>
+              <a:t>02.06.2018</a:t>
             </a:fld>
             <a:endParaRPr lang="de-DE"/>
           </a:p>
@@ -1984,7 +1984,7 @@
           <a:p>
             <a:fld id="{7F847C87-CECF-4A9A-88F5-87615B577ED8}" type="datetimeFigureOut">
               <a:rPr lang="de-DE" smtClean="0"/>
-              <a:t>28.05.2018</a:t>
+              <a:t>02.06.2018</a:t>
             </a:fld>
             <a:endParaRPr lang="de-DE"/>
           </a:p>
@@ -2079,7 +2079,7 @@
           <a:p>
             <a:fld id="{7F847C87-CECF-4A9A-88F5-87615B577ED8}" type="datetimeFigureOut">
               <a:rPr lang="de-DE" smtClean="0"/>
-              <a:t>28.05.2018</a:t>
+              <a:t>02.06.2018</a:t>
             </a:fld>
             <a:endParaRPr lang="de-DE"/>
           </a:p>
@@ -2356,7 +2356,7 @@
           <a:p>
             <a:fld id="{7F847C87-CECF-4A9A-88F5-87615B577ED8}" type="datetimeFigureOut">
               <a:rPr lang="de-DE" smtClean="0"/>
-              <a:t>28.05.2018</a:t>
+              <a:t>02.06.2018</a:t>
             </a:fld>
             <a:endParaRPr lang="de-DE"/>
           </a:p>
@@ -2609,7 +2609,7 @@
           <a:p>
             <a:fld id="{7F847C87-CECF-4A9A-88F5-87615B577ED8}" type="datetimeFigureOut">
               <a:rPr lang="de-DE" smtClean="0"/>
-              <a:t>28.05.2018</a:t>
+              <a:t>02.06.2018</a:t>
             </a:fld>
             <a:endParaRPr lang="de-DE"/>
           </a:p>
@@ -2815,7 +2815,7 @@
           <a:p>
             <a:fld id="{7F847C87-CECF-4A9A-88F5-87615B577ED8}" type="datetimeFigureOut">
               <a:rPr lang="de-DE" smtClean="0"/>
-              <a:t>28.05.2018</a:t>
+              <a:t>02.06.2018</a:t>
             </a:fld>
             <a:endParaRPr lang="de-DE"/>
           </a:p>
@@ -25824,8 +25824,8 @@
         </p:nvSpPr>
         <p:spPr>
           <a:xfrm>
-            <a:off x="457200" y="1484784"/>
-            <a:ext cx="8229600" cy="1800200"/>
+            <a:off x="457200" y="1638557"/>
+            <a:ext cx="8229600" cy="2150483"/>
           </a:xfrm>
           <a:prstGeom prst="rect">
             <a:avLst/>
@@ -25870,7 +25870,7 @@
         </p:nvCxnSpPr>
         <p:spPr>
           <a:xfrm>
-            <a:off x="4572000" y="3825044"/>
+            <a:off x="4572000" y="4329100"/>
             <a:ext cx="4114800" cy="0"/>
           </a:xfrm>
           <a:prstGeom prst="straightConnector1">
@@ -25907,8 +25907,8 @@
         </p:nvCxnSpPr>
         <p:spPr>
           <a:xfrm>
-            <a:off x="4572000" y="980728"/>
-            <a:ext cx="0" cy="2988332"/>
+            <a:off x="4572000" y="1125538"/>
+            <a:ext cx="0" cy="3347578"/>
           </a:xfrm>
           <a:prstGeom prst="line">
             <a:avLst/>
@@ -25944,7 +25944,7 @@
         </p:nvSpPr>
         <p:spPr>
           <a:xfrm>
-            <a:off x="4932040" y="3578823"/>
+            <a:off x="4932040" y="4082879"/>
             <a:ext cx="1368152" cy="246221"/>
           </a:xfrm>
           <a:prstGeom prst="rect">
@@ -25972,10 +25972,6 @@
               </a:rPr>
               <a:t> / 2</a:t>
             </a:r>
-            <a:endParaRPr lang="de-DE" sz="1000" dirty="0" smtClean="0">
-              <a:latin typeface="Arial" panose="020B0604020202020204" pitchFamily="34" charset="0"/>
-              <a:cs typeface="Arial" panose="020B0604020202020204" pitchFamily="34" charset="0"/>
-            </a:endParaRPr>
           </a:p>
         </p:txBody>
       </p:sp>
@@ -25987,8 +25983,8 @@
         </p:nvCxnSpPr>
         <p:spPr>
           <a:xfrm>
-            <a:off x="5148064" y="980728"/>
-            <a:ext cx="0" cy="1008112"/>
+            <a:off x="5148064" y="1124744"/>
+            <a:ext cx="0" cy="2664296"/>
           </a:xfrm>
           <a:prstGeom prst="line">
             <a:avLst/>
@@ -26024,8 +26020,8 @@
         </p:nvCxnSpPr>
         <p:spPr>
           <a:xfrm>
-            <a:off x="8686800" y="980728"/>
-            <a:ext cx="0" cy="2988332"/>
+            <a:off x="8686800" y="1110806"/>
+            <a:ext cx="0" cy="3362310"/>
           </a:xfrm>
           <a:prstGeom prst="line">
             <a:avLst/>
@@ -26061,8 +26057,8 @@
         </p:nvCxnSpPr>
         <p:spPr>
           <a:xfrm>
-            <a:off x="6732240" y="980728"/>
-            <a:ext cx="0" cy="1008112"/>
+            <a:off x="6732240" y="1114468"/>
+            <a:ext cx="0" cy="2674895"/>
           </a:xfrm>
           <a:prstGeom prst="line">
             <a:avLst/>
@@ -26098,7 +26094,7 @@
         </p:nvSpPr>
         <p:spPr>
           <a:xfrm>
-            <a:off x="4463988" y="944724"/>
+            <a:off x="4463988" y="1110806"/>
             <a:ext cx="756084" cy="553998"/>
           </a:xfrm>
           <a:prstGeom prst="rect">
@@ -26146,19 +26142,8 @@
                 <a:latin typeface="Arial" panose="020B0604020202020204" pitchFamily="34" charset="0"/>
                 <a:cs typeface="Arial" panose="020B0604020202020204" pitchFamily="34" charset="0"/>
               </a:rPr>
-              <a:t>1</a:t>
-            </a:r>
-            <a:r>
-              <a:rPr lang="de-DE" sz="1000" dirty="0" smtClean="0">
-                <a:latin typeface="Arial" panose="020B0604020202020204" pitchFamily="34" charset="0"/>
-                <a:cs typeface="Arial" panose="020B0604020202020204" pitchFamily="34" charset="0"/>
-              </a:rPr>
-              <a:t> / 12</a:t>
-            </a:r>
-            <a:endParaRPr lang="de-DE" sz="1000" dirty="0" smtClean="0">
-              <a:latin typeface="Arial" panose="020B0604020202020204" pitchFamily="34" charset="0"/>
-              <a:cs typeface="Arial" panose="020B0604020202020204" pitchFamily="34" charset="0"/>
-            </a:endParaRPr>
+              <a:t>1 / 12</a:t>
+            </a:r>
           </a:p>
         </p:txBody>
       </p:sp>
@@ -26170,7 +26155,7 @@
         </p:nvSpPr>
         <p:spPr>
           <a:xfrm>
-            <a:off x="5436096" y="944724"/>
+            <a:off x="5436096" y="1110806"/>
             <a:ext cx="972108" cy="553998"/>
           </a:xfrm>
           <a:prstGeom prst="rect">
@@ -26227,10 +26212,6 @@
               </a:rPr>
               <a:t> / 12</a:t>
             </a:r>
-            <a:endParaRPr lang="de-DE" sz="1000" dirty="0" smtClean="0">
-              <a:latin typeface="Arial" panose="020B0604020202020204" pitchFamily="34" charset="0"/>
-              <a:cs typeface="Arial" panose="020B0604020202020204" pitchFamily="34" charset="0"/>
-            </a:endParaRPr>
           </a:p>
         </p:txBody>
       </p:sp>
@@ -26242,7 +26223,7 @@
         </p:nvSpPr>
         <p:spPr>
           <a:xfrm>
-            <a:off x="7236296" y="944724"/>
+            <a:off x="7236296" y="1110806"/>
             <a:ext cx="1116124" cy="553998"/>
           </a:xfrm>
           <a:prstGeom prst="rect">
@@ -26304,19 +26285,22 @@
                 <a:latin typeface="Arial" panose="020B0604020202020204" pitchFamily="34" charset="0"/>
                 <a:cs typeface="Arial" panose="020B0604020202020204" pitchFamily="34" charset="0"/>
               </a:rPr>
-              <a:t>2</a:t>
+              <a:t>3</a:t>
             </a:r>
             <a:r>
               <a:rPr lang="de-DE" sz="1000" dirty="0" smtClean="0">
                 <a:latin typeface="Arial" panose="020B0604020202020204" pitchFamily="34" charset="0"/>
                 <a:cs typeface="Arial" panose="020B0604020202020204" pitchFamily="34" charset="0"/>
               </a:rPr>
-              <a:t> / 12</a:t>
-            </a:r>
-            <a:endParaRPr lang="de-DE" sz="1000" dirty="0" smtClean="0">
-              <a:latin typeface="Arial" panose="020B0604020202020204" pitchFamily="34" charset="0"/>
-              <a:cs typeface="Arial" panose="020B0604020202020204" pitchFamily="34" charset="0"/>
-            </a:endParaRPr>
+              <a:t> </a:t>
+            </a:r>
+            <a:r>
+              <a:rPr lang="de-DE" sz="1000" dirty="0" smtClean="0">
+                <a:latin typeface="Arial" panose="020B0604020202020204" pitchFamily="34" charset="0"/>
+                <a:cs typeface="Arial" panose="020B0604020202020204" pitchFamily="34" charset="0"/>
+              </a:rPr>
+              <a:t>/ 12</a:t>
+            </a:r>
           </a:p>
         </p:txBody>
       </p:sp>
@@ -26328,7 +26312,7 @@
         </p:nvSpPr>
         <p:spPr>
           <a:xfrm>
-            <a:off x="5580112" y="1760047"/>
+            <a:off x="5400092" y="1736812"/>
             <a:ext cx="1164101" cy="400110"/>
           </a:xfrm>
           <a:prstGeom prst="rect">
@@ -26343,19 +26327,19 @@
           <a:lstStyle/>
           <a:p>
             <a:r>
-              <a:rPr lang="de-DE" sz="1000" b="1" dirty="0" err="1" smtClean="0">
-                <a:solidFill>
-                  <a:srgbClr val="C00000"/>
-                </a:solidFill>
-                <a:latin typeface="Arial" panose="020B0604020202020204" pitchFamily="34" charset="0"/>
-                <a:cs typeface="Arial" panose="020B0604020202020204" pitchFamily="34" charset="0"/>
-              </a:rPr>
-              <a:t>rowAlign</a:t>
-            </a:r>
-            <a:r>
-              <a:rPr lang="de-DE" sz="1000" b="1" dirty="0" smtClean="0">
-                <a:solidFill>
-                  <a:srgbClr val="C00000"/>
+              <a:rPr lang="de-DE" sz="1000" b="1" dirty="0" err="1">
+                <a:solidFill>
+                  <a:srgbClr val="00B050"/>
+                </a:solidFill>
+                <a:latin typeface="Arial" panose="020B0604020202020204" pitchFamily="34" charset="0"/>
+                <a:cs typeface="Arial" panose="020B0604020202020204" pitchFamily="34" charset="0"/>
+              </a:rPr>
+              <a:t>colAlign</a:t>
+            </a:r>
+            <a:r>
+              <a:rPr lang="de-DE" sz="1000" b="1" dirty="0">
+                <a:solidFill>
+                  <a:srgbClr val="00B050"/>
                 </a:solidFill>
                 <a:latin typeface="Arial" panose="020B0604020202020204" pitchFamily="34" charset="0"/>
                 <a:cs typeface="Arial" panose="020B0604020202020204" pitchFamily="34" charset="0"/>
@@ -26363,18 +26347,18 @@
               <a:t> = </a:t>
             </a:r>
             <a:r>
-              <a:rPr lang="de-DE" sz="1000" b="1" dirty="0" err="1" smtClean="0">
-                <a:solidFill>
-                  <a:srgbClr val="C00000"/>
+              <a:rPr lang="de-DE" sz="1000" b="1" dirty="0" err="1">
+                <a:solidFill>
+                  <a:srgbClr val="00B050"/>
                 </a:solidFill>
                 <a:latin typeface="Arial" panose="020B0604020202020204" pitchFamily="34" charset="0"/>
                 <a:cs typeface="Arial" panose="020B0604020202020204" pitchFamily="34" charset="0"/>
               </a:rPr>
               <a:t>right</a:t>
             </a:r>
-            <a:endParaRPr lang="de-DE" sz="1000" b="1" dirty="0" smtClean="0">
+            <a:endParaRPr lang="de-DE" sz="1000" b="1" dirty="0">
               <a:solidFill>
-                <a:srgbClr val="C00000"/>
+                <a:srgbClr val="00B050"/>
               </a:solidFill>
               <a:latin typeface="Arial" panose="020B0604020202020204" pitchFamily="34" charset="0"/>
               <a:cs typeface="Arial" panose="020B0604020202020204" pitchFamily="34" charset="0"/>
@@ -26384,27 +26368,37 @@
             <a:r>
               <a:rPr lang="de-DE" sz="1000" b="1" dirty="0" err="1" smtClean="0">
                 <a:solidFill>
-                  <a:srgbClr val="00B050"/>
-                </a:solidFill>
-                <a:latin typeface="Arial" panose="020B0604020202020204" pitchFamily="34" charset="0"/>
-                <a:cs typeface="Arial" panose="020B0604020202020204" pitchFamily="34" charset="0"/>
-              </a:rPr>
-              <a:t>colAlign</a:t>
+                  <a:srgbClr val="C00000"/>
+                </a:solidFill>
+                <a:latin typeface="Arial" panose="020B0604020202020204" pitchFamily="34" charset="0"/>
+                <a:cs typeface="Arial" panose="020B0604020202020204" pitchFamily="34" charset="0"/>
+              </a:rPr>
+              <a:t>rowAlign</a:t>
             </a:r>
             <a:r>
               <a:rPr lang="de-DE" sz="1000" b="1" dirty="0" smtClean="0">
                 <a:solidFill>
-                  <a:srgbClr val="00B050"/>
-                </a:solidFill>
-                <a:latin typeface="Arial" panose="020B0604020202020204" pitchFamily="34" charset="0"/>
-                <a:cs typeface="Arial" panose="020B0604020202020204" pitchFamily="34" charset="0"/>
-              </a:rPr>
-              <a:t> = </a:t>
+                  <a:srgbClr val="C00000"/>
+                </a:solidFill>
+                <a:latin typeface="Arial" panose="020B0604020202020204" pitchFamily="34" charset="0"/>
+                <a:cs typeface="Arial" panose="020B0604020202020204" pitchFamily="34" charset="0"/>
+              </a:rPr>
+              <a:t> </a:t>
+            </a:r>
+            <a:r>
+              <a:rPr lang="de-DE" sz="1000" b="1" dirty="0" smtClean="0">
+                <a:solidFill>
+                  <a:srgbClr val="C00000"/>
+                </a:solidFill>
+                <a:latin typeface="Arial" panose="020B0604020202020204" pitchFamily="34" charset="0"/>
+                <a:cs typeface="Arial" panose="020B0604020202020204" pitchFamily="34" charset="0"/>
+              </a:rPr>
+              <a:t>= </a:t>
             </a:r>
             <a:r>
               <a:rPr lang="de-DE" sz="1000" b="1" dirty="0" err="1" smtClean="0">
                 <a:solidFill>
-                  <a:srgbClr val="00B050"/>
+                  <a:srgbClr val="C00000"/>
                 </a:solidFill>
                 <a:latin typeface="Arial" panose="020B0604020202020204" pitchFamily="34" charset="0"/>
                 <a:cs typeface="Arial" panose="020B0604020202020204" pitchFamily="34" charset="0"/>
@@ -26413,7 +26407,7 @@
             </a:r>
             <a:endParaRPr lang="de-DE" sz="1000" b="1" dirty="0" smtClean="0">
               <a:solidFill>
-                <a:srgbClr val="00B050"/>
+                <a:srgbClr val="C00000"/>
               </a:solidFill>
               <a:latin typeface="Arial" panose="020B0604020202020204" pitchFamily="34" charset="0"/>
               <a:cs typeface="Arial" panose="020B0604020202020204" pitchFamily="34" charset="0"/>
@@ -26429,7 +26423,7 @@
         </p:nvSpPr>
         <p:spPr>
           <a:xfrm>
-            <a:off x="2147759" y="1789336"/>
+            <a:off x="2708775" y="1736812"/>
             <a:ext cx="1164101" cy="400110"/>
           </a:xfrm>
           <a:prstGeom prst="rect">
@@ -26444,19 +26438,19 @@
           <a:lstStyle/>
           <a:p>
             <a:r>
-              <a:rPr lang="de-DE" sz="1000" b="1" dirty="0" err="1" smtClean="0">
-                <a:solidFill>
-                  <a:srgbClr val="C00000"/>
-                </a:solidFill>
-                <a:latin typeface="Arial" panose="020B0604020202020204" pitchFamily="34" charset="0"/>
-                <a:cs typeface="Arial" panose="020B0604020202020204" pitchFamily="34" charset="0"/>
-              </a:rPr>
-              <a:t>rowAlign</a:t>
-            </a:r>
-            <a:r>
-              <a:rPr lang="de-DE" sz="1000" b="1" dirty="0" smtClean="0">
-                <a:solidFill>
-                  <a:srgbClr val="C00000"/>
+              <a:rPr lang="de-DE" sz="1000" b="1" dirty="0" err="1">
+                <a:solidFill>
+                  <a:srgbClr val="00B050"/>
+                </a:solidFill>
+                <a:latin typeface="Arial" panose="020B0604020202020204" pitchFamily="34" charset="0"/>
+                <a:cs typeface="Arial" panose="020B0604020202020204" pitchFamily="34" charset="0"/>
+              </a:rPr>
+              <a:t>colAlign</a:t>
+            </a:r>
+            <a:r>
+              <a:rPr lang="de-DE" sz="1000" b="1" dirty="0">
+                <a:solidFill>
+                  <a:srgbClr val="00B050"/>
                 </a:solidFill>
                 <a:latin typeface="Arial" panose="020B0604020202020204" pitchFamily="34" charset="0"/>
                 <a:cs typeface="Arial" panose="020B0604020202020204" pitchFamily="34" charset="0"/>
@@ -26464,18 +26458,18 @@
               <a:t> = </a:t>
             </a:r>
             <a:r>
-              <a:rPr lang="de-DE" sz="1000" b="1" dirty="0" err="1" smtClean="0">
-                <a:solidFill>
-                  <a:srgbClr val="C00000"/>
-                </a:solidFill>
-                <a:latin typeface="Arial" panose="020B0604020202020204" pitchFamily="34" charset="0"/>
-                <a:cs typeface="Arial" panose="020B0604020202020204" pitchFamily="34" charset="0"/>
-              </a:rPr>
-              <a:t>right</a:t>
-            </a:r>
-            <a:endParaRPr lang="de-DE" sz="1000" b="1" dirty="0" smtClean="0">
+              <a:rPr lang="de-DE" sz="1000" b="1" dirty="0" err="1">
+                <a:solidFill>
+                  <a:srgbClr val="00B050"/>
+                </a:solidFill>
+                <a:latin typeface="Arial" panose="020B0604020202020204" pitchFamily="34" charset="0"/>
+                <a:cs typeface="Arial" panose="020B0604020202020204" pitchFamily="34" charset="0"/>
+              </a:rPr>
+              <a:t>left</a:t>
+            </a:r>
+            <a:endParaRPr lang="de-DE" sz="1000" b="1" dirty="0">
               <a:solidFill>
-                <a:srgbClr val="C00000"/>
+                <a:srgbClr val="00B050"/>
               </a:solidFill>
               <a:latin typeface="Arial" panose="020B0604020202020204" pitchFamily="34" charset="0"/>
               <a:cs typeface="Arial" panose="020B0604020202020204" pitchFamily="34" charset="0"/>
@@ -26485,36 +26479,46 @@
             <a:r>
               <a:rPr lang="de-DE" sz="1000" b="1" dirty="0" err="1" smtClean="0">
                 <a:solidFill>
-                  <a:srgbClr val="00B050"/>
-                </a:solidFill>
-                <a:latin typeface="Arial" panose="020B0604020202020204" pitchFamily="34" charset="0"/>
-                <a:cs typeface="Arial" panose="020B0604020202020204" pitchFamily="34" charset="0"/>
-              </a:rPr>
-              <a:t>colAlign</a:t>
+                  <a:srgbClr val="C00000"/>
+                </a:solidFill>
+                <a:latin typeface="Arial" panose="020B0604020202020204" pitchFamily="34" charset="0"/>
+                <a:cs typeface="Arial" panose="020B0604020202020204" pitchFamily="34" charset="0"/>
+              </a:rPr>
+              <a:t>rowAlign</a:t>
             </a:r>
             <a:r>
               <a:rPr lang="de-DE" sz="1000" b="1" dirty="0" smtClean="0">
                 <a:solidFill>
-                  <a:srgbClr val="00B050"/>
-                </a:solidFill>
-                <a:latin typeface="Arial" panose="020B0604020202020204" pitchFamily="34" charset="0"/>
-                <a:cs typeface="Arial" panose="020B0604020202020204" pitchFamily="34" charset="0"/>
-              </a:rPr>
-              <a:t> = </a:t>
+                  <a:srgbClr val="C00000"/>
+                </a:solidFill>
+                <a:latin typeface="Arial" panose="020B0604020202020204" pitchFamily="34" charset="0"/>
+                <a:cs typeface="Arial" panose="020B0604020202020204" pitchFamily="34" charset="0"/>
+              </a:rPr>
+              <a:t> </a:t>
+            </a:r>
+            <a:r>
+              <a:rPr lang="de-DE" sz="1000" b="1" dirty="0" smtClean="0">
+                <a:solidFill>
+                  <a:srgbClr val="C00000"/>
+                </a:solidFill>
+                <a:latin typeface="Arial" panose="020B0604020202020204" pitchFamily="34" charset="0"/>
+                <a:cs typeface="Arial" panose="020B0604020202020204" pitchFamily="34" charset="0"/>
+              </a:rPr>
+              <a:t>= </a:t>
             </a:r>
             <a:r>
               <a:rPr lang="de-DE" sz="1000" b="1" dirty="0" err="1" smtClean="0">
                 <a:solidFill>
-                  <a:srgbClr val="00B050"/>
-                </a:solidFill>
-                <a:latin typeface="Arial" panose="020B0604020202020204" pitchFamily="34" charset="0"/>
-                <a:cs typeface="Arial" panose="020B0604020202020204" pitchFamily="34" charset="0"/>
-              </a:rPr>
-              <a:t>left</a:t>
+                  <a:srgbClr val="C00000"/>
+                </a:solidFill>
+                <a:latin typeface="Arial" panose="020B0604020202020204" pitchFamily="34" charset="0"/>
+                <a:cs typeface="Arial" panose="020B0604020202020204" pitchFamily="34" charset="0"/>
+              </a:rPr>
+              <a:t>right</a:t>
             </a:r>
             <a:endParaRPr lang="de-DE" sz="1000" b="1" dirty="0" smtClean="0">
               <a:solidFill>
-                <a:srgbClr val="00B050"/>
+                <a:srgbClr val="C00000"/>
               </a:solidFill>
               <a:latin typeface="Arial" panose="020B0604020202020204" pitchFamily="34" charset="0"/>
               <a:cs typeface="Arial" panose="020B0604020202020204" pitchFamily="34" charset="0"/>
@@ -26530,7 +26534,7 @@
         </p:nvSpPr>
         <p:spPr>
           <a:xfrm>
-            <a:off x="6162163" y="2276872"/>
+            <a:off x="6162163" y="2744924"/>
             <a:ext cx="569846" cy="144016"/>
           </a:xfrm>
           <a:prstGeom prst="rect">
@@ -26580,7 +26584,7 @@
         </p:nvSpPr>
         <p:spPr>
           <a:xfrm>
-            <a:off x="6333844" y="2888940"/>
+            <a:off x="6321640" y="3465004"/>
             <a:ext cx="410369" cy="144016"/>
           </a:xfrm>
           <a:prstGeom prst="rect">
@@ -26630,7 +26634,7 @@
         </p:nvSpPr>
         <p:spPr>
           <a:xfrm>
-            <a:off x="2213927" y="2276872"/>
+            <a:off x="2501959" y="2744924"/>
             <a:ext cx="569846" cy="144016"/>
           </a:xfrm>
           <a:prstGeom prst="rect">
@@ -26680,7 +26684,7 @@
         </p:nvSpPr>
         <p:spPr>
           <a:xfrm>
-            <a:off x="2385608" y="2888940"/>
+            <a:off x="2661436" y="3465004"/>
             <a:ext cx="410369" cy="144016"/>
           </a:xfrm>
           <a:prstGeom prst="rect">
@@ -26730,8 +26734,8 @@
         </p:nvCxnSpPr>
         <p:spPr>
           <a:xfrm flipV="1">
-            <a:off x="1835696" y="1484784"/>
-            <a:ext cx="0" cy="936104"/>
+            <a:off x="1875388" y="1638558"/>
+            <a:ext cx="0" cy="1250382"/>
           </a:xfrm>
           <a:prstGeom prst="straightConnector1">
             <a:avLst/>
@@ -26767,7 +26771,7 @@
         </p:nvCxnSpPr>
         <p:spPr>
           <a:xfrm>
-            <a:off x="1702423" y="2420888"/>
+            <a:off x="1702423" y="2888940"/>
             <a:ext cx="5245841" cy="0"/>
           </a:xfrm>
           <a:prstGeom prst="line">
@@ -26804,7 +26808,7 @@
         </p:nvCxnSpPr>
         <p:spPr>
           <a:xfrm>
-            <a:off x="1043608" y="3032956"/>
+            <a:off x="1043608" y="3609020"/>
             <a:ext cx="5813346" cy="0"/>
           </a:xfrm>
           <a:prstGeom prst="line">
@@ -26841,8 +26845,8 @@
         </p:nvSpPr>
         <p:spPr>
           <a:xfrm>
-            <a:off x="1533146" y="1376772"/>
-            <a:ext cx="338554" cy="1008112"/>
+            <a:off x="1583668" y="1457840"/>
+            <a:ext cx="338554" cy="1395096"/>
           </a:xfrm>
           <a:prstGeom prst="rect">
             <a:avLst/>
@@ -26867,7 +26871,14 @@
                 <a:latin typeface="Arial" panose="020B0604020202020204" pitchFamily="34" charset="0"/>
                 <a:cs typeface="Arial" panose="020B0604020202020204" pitchFamily="34" charset="0"/>
               </a:rPr>
-              <a:t> / 2</a:t>
+              <a:t> </a:t>
+            </a:r>
+            <a:r>
+              <a:rPr lang="de-DE" sz="1000" dirty="0" smtClean="0">
+                <a:latin typeface="Arial" panose="020B0604020202020204" pitchFamily="34" charset="0"/>
+                <a:cs typeface="Arial" panose="020B0604020202020204" pitchFamily="34" charset="0"/>
+              </a:rPr>
+              <a:t>* 7 / 12</a:t>
             </a:r>
             <a:endParaRPr lang="de-DE" sz="1000" dirty="0" smtClean="0">
               <a:latin typeface="Arial" panose="020B0604020202020204" pitchFamily="34" charset="0"/>
@@ -26884,8 +26895,8 @@
         </p:nvCxnSpPr>
         <p:spPr>
           <a:xfrm flipV="1">
-            <a:off x="1259632" y="1498722"/>
-            <a:ext cx="0" cy="1552354"/>
+            <a:off x="1223628" y="1628776"/>
+            <a:ext cx="0" cy="1980244"/>
           </a:xfrm>
           <a:prstGeom prst="straightConnector1">
             <a:avLst/>
@@ -26921,7 +26932,7 @@
         </p:nvSpPr>
         <p:spPr>
           <a:xfrm>
-            <a:off x="971600" y="1592796"/>
+            <a:off x="935596" y="1974902"/>
             <a:ext cx="338554" cy="1296144"/>
           </a:xfrm>
           <a:prstGeom prst="rect">
@@ -26947,9 +26958,577 @@
                 <a:latin typeface="Arial" panose="020B0604020202020204" pitchFamily="34" charset="0"/>
                 <a:cs typeface="Arial" panose="020B0604020202020204" pitchFamily="34" charset="0"/>
               </a:rPr>
-              <a:t> * 11 / 12</a:t>
+              <a:t> * </a:t>
+            </a:r>
+            <a:r>
+              <a:rPr lang="de-DE" sz="1000" dirty="0" smtClean="0">
+                <a:latin typeface="Arial" panose="020B0604020202020204" pitchFamily="34" charset="0"/>
+                <a:cs typeface="Arial" panose="020B0604020202020204" pitchFamily="34" charset="0"/>
+              </a:rPr>
+              <a:t>11 </a:t>
+            </a:r>
+            <a:r>
+              <a:rPr lang="de-DE" sz="1000" dirty="0" smtClean="0">
+                <a:latin typeface="Arial" panose="020B0604020202020204" pitchFamily="34" charset="0"/>
+                <a:cs typeface="Arial" panose="020B0604020202020204" pitchFamily="34" charset="0"/>
+              </a:rPr>
+              <a:t>/ 12</a:t>
+            </a:r>
+          </a:p>
+        </p:txBody>
+      </p:sp>
+      <p:sp>
+        <p:nvSpPr>
+          <p:cNvPr id="8" name="Rechteck 7"/>
+          <p:cNvSpPr/>
+          <p:nvPr/>
+        </p:nvSpPr>
+        <p:spPr>
+          <a:xfrm>
+            <a:off x="2498850" y="1125538"/>
+            <a:ext cx="1583953" cy="2663502"/>
+          </a:xfrm>
+          <a:prstGeom prst="rect">
+            <a:avLst/>
+          </a:prstGeom>
+          <a:noFill/>
+          <a:ln w="19050">
+            <a:solidFill>
+              <a:schemeClr val="tx1"/>
+            </a:solidFill>
+          </a:ln>
+        </p:spPr>
+        <p:style>
+          <a:lnRef idx="2">
+            <a:schemeClr val="accent1">
+              <a:shade val="50000"/>
+            </a:schemeClr>
+          </a:lnRef>
+          <a:fillRef idx="1">
+            <a:schemeClr val="accent1"/>
+          </a:fillRef>
+          <a:effectRef idx="0">
+            <a:schemeClr val="accent1"/>
+          </a:effectRef>
+          <a:fontRef idx="minor">
+            <a:schemeClr val="lt1"/>
+          </a:fontRef>
+        </p:style>
+        <p:txBody>
+          <a:bodyPr rtlCol="0" anchor="ctr"/>
+          <a:lstStyle/>
+          <a:p>
+            <a:pPr algn="ctr"/>
+            <a:endParaRPr lang="de-DE"/>
+          </a:p>
+        </p:txBody>
+      </p:sp>
+      <p:sp>
+        <p:nvSpPr>
+          <p:cNvPr id="6" name="Ellipse 5"/>
+          <p:cNvSpPr/>
+          <p:nvPr/>
+        </p:nvSpPr>
+        <p:spPr>
+          <a:xfrm>
+            <a:off x="2426850" y="1556792"/>
+            <a:ext cx="144000" cy="144000"/>
+          </a:xfrm>
+          <a:prstGeom prst="ellipse">
+            <a:avLst/>
+          </a:prstGeom>
+          <a:solidFill>
+            <a:srgbClr val="00B050"/>
+          </a:solidFill>
+          <a:ln w="19050">
+            <a:solidFill>
+              <a:schemeClr val="tx1"/>
+            </a:solidFill>
+          </a:ln>
+        </p:spPr>
+        <p:style>
+          <a:lnRef idx="2">
+            <a:schemeClr val="accent1">
+              <a:shade val="50000"/>
+            </a:schemeClr>
+          </a:lnRef>
+          <a:fillRef idx="1">
+            <a:schemeClr val="accent1"/>
+          </a:fillRef>
+          <a:effectRef idx="0">
+            <a:schemeClr val="accent1"/>
+          </a:effectRef>
+          <a:fontRef idx="minor">
+            <a:schemeClr val="lt1"/>
+          </a:fontRef>
+        </p:style>
+        <p:txBody>
+          <a:bodyPr rtlCol="0" anchor="ctr"/>
+          <a:lstStyle/>
+          <a:p>
+            <a:pPr algn="ctr"/>
+            <a:endParaRPr lang="de-DE"/>
+          </a:p>
+        </p:txBody>
+      </p:sp>
+      <p:sp>
+        <p:nvSpPr>
+          <p:cNvPr id="28" name="Textfeld 27"/>
+          <p:cNvSpPr txBox="1"/>
+          <p:nvPr/>
+        </p:nvSpPr>
+        <p:spPr>
+          <a:xfrm>
+            <a:off x="791580" y="1160748"/>
+            <a:ext cx="745717" cy="246221"/>
+          </a:xfrm>
+          <a:prstGeom prst="rect">
+            <a:avLst/>
+          </a:prstGeom>
+          <a:noFill/>
+        </p:spPr>
+        <p:txBody>
+          <a:bodyPr wrap="none" rtlCol="0">
+            <a:spAutoFit/>
+          </a:bodyPr>
+          <a:lstStyle/>
+          <a:p>
+            <a:r>
+              <a:rPr lang="de-DE" sz="1000" b="1" dirty="0" err="1" smtClean="0">
+                <a:solidFill>
+                  <a:srgbClr val="00B050"/>
+                </a:solidFill>
+                <a:latin typeface="Arial" panose="020B0604020202020204" pitchFamily="34" charset="0"/>
+                <a:cs typeface="Arial" panose="020B0604020202020204" pitchFamily="34" charset="0"/>
+              </a:rPr>
+              <a:t>colOrigin</a:t>
+            </a:r>
+            <a:endParaRPr lang="de-DE" sz="1000" b="1" dirty="0" smtClean="0">
+              <a:solidFill>
+                <a:srgbClr val="00B050"/>
+              </a:solidFill>
+              <a:latin typeface="Arial" panose="020B0604020202020204" pitchFamily="34" charset="0"/>
+              <a:cs typeface="Arial" panose="020B0604020202020204" pitchFamily="34" charset="0"/>
+            </a:endParaRPr>
+          </a:p>
+        </p:txBody>
+      </p:sp>
+      <p:cxnSp>
+        <p:nvCxnSpPr>
+          <p:cNvPr id="12" name="Gerade Verbindung 11"/>
+          <p:cNvCxnSpPr/>
+          <p:nvPr/>
+        </p:nvCxnSpPr>
+        <p:spPr>
+          <a:xfrm>
+            <a:off x="1482234" y="1304764"/>
+            <a:ext cx="1016616" cy="323577"/>
+          </a:xfrm>
+          <a:prstGeom prst="line">
+            <a:avLst/>
+          </a:prstGeom>
+          <a:ln w="19050">
+            <a:solidFill>
+              <a:srgbClr val="00B050"/>
+            </a:solidFill>
+            <a:headEnd type="none" w="med" len="med"/>
+            <a:tailEnd type="none" w="med" len="med"/>
+          </a:ln>
+        </p:spPr>
+        <p:style>
+          <a:lnRef idx="1">
+            <a:schemeClr val="accent1"/>
+          </a:lnRef>
+          <a:fillRef idx="0">
+            <a:schemeClr val="accent1"/>
+          </a:fillRef>
+          <a:effectRef idx="0">
+            <a:schemeClr val="accent1"/>
+          </a:effectRef>
+          <a:fontRef idx="minor">
+            <a:schemeClr val="tx1"/>
+          </a:fontRef>
+        </p:style>
+      </p:cxnSp>
+      <p:sp>
+        <p:nvSpPr>
+          <p:cNvPr id="35" name="Textfeld 34"/>
+          <p:cNvSpPr txBox="1"/>
+          <p:nvPr/>
+        </p:nvSpPr>
+        <p:spPr>
+          <a:xfrm>
+            <a:off x="2804771" y="1088740"/>
+            <a:ext cx="972108" cy="246221"/>
+          </a:xfrm>
+          <a:prstGeom prst="rect">
+            <a:avLst/>
+          </a:prstGeom>
+          <a:noFill/>
+        </p:spPr>
+        <p:txBody>
+          <a:bodyPr wrap="square" rtlCol="0">
+            <a:spAutoFit/>
+          </a:bodyPr>
+          <a:lstStyle/>
+          <a:p>
+            <a:pPr algn="ctr"/>
+            <a:r>
+              <a:rPr lang="de-DE" sz="1000" dirty="0" err="1" smtClean="0">
+                <a:latin typeface="Arial" panose="020B0604020202020204" pitchFamily="34" charset="0"/>
+                <a:cs typeface="Arial" panose="020B0604020202020204" pitchFamily="34" charset="0"/>
+              </a:rPr>
+              <a:t>textColumn</a:t>
             </a:r>
             <a:endParaRPr lang="de-DE" sz="1000" dirty="0" smtClean="0">
+              <a:latin typeface="Arial" panose="020B0604020202020204" pitchFamily="34" charset="0"/>
+              <a:cs typeface="Arial" panose="020B0604020202020204" pitchFamily="34" charset="0"/>
+            </a:endParaRPr>
+          </a:p>
+        </p:txBody>
+      </p:sp>
+      <p:sp>
+        <p:nvSpPr>
+          <p:cNvPr id="43" name="Ellipse 42"/>
+          <p:cNvSpPr/>
+          <p:nvPr/>
+        </p:nvSpPr>
+        <p:spPr>
+          <a:xfrm>
+            <a:off x="2426850" y="2670959"/>
+            <a:ext cx="144000" cy="144000"/>
+          </a:xfrm>
+          <a:prstGeom prst="ellipse">
+            <a:avLst/>
+          </a:prstGeom>
+          <a:solidFill>
+            <a:srgbClr val="C00000"/>
+          </a:solidFill>
+          <a:ln w="19050">
+            <a:solidFill>
+              <a:schemeClr val="tx1"/>
+            </a:solidFill>
+          </a:ln>
+        </p:spPr>
+        <p:style>
+          <a:lnRef idx="2">
+            <a:schemeClr val="accent1">
+              <a:shade val="50000"/>
+            </a:schemeClr>
+          </a:lnRef>
+          <a:fillRef idx="1">
+            <a:schemeClr val="accent1"/>
+          </a:fillRef>
+          <a:effectRef idx="0">
+            <a:schemeClr val="accent1"/>
+          </a:effectRef>
+          <a:fontRef idx="minor">
+            <a:schemeClr val="lt1"/>
+          </a:fontRef>
+        </p:style>
+        <p:txBody>
+          <a:bodyPr rtlCol="0" anchor="ctr"/>
+          <a:lstStyle/>
+          <a:p>
+            <a:pPr algn="ctr"/>
+            <a:endParaRPr lang="de-DE"/>
+          </a:p>
+        </p:txBody>
+      </p:sp>
+      <p:sp>
+        <p:nvSpPr>
+          <p:cNvPr id="44" name="Ellipse 43"/>
+          <p:cNvSpPr/>
+          <p:nvPr/>
+        </p:nvSpPr>
+        <p:spPr>
+          <a:xfrm>
+            <a:off x="2579250" y="3393004"/>
+            <a:ext cx="144000" cy="144000"/>
+          </a:xfrm>
+          <a:prstGeom prst="ellipse">
+            <a:avLst/>
+          </a:prstGeom>
+          <a:solidFill>
+            <a:srgbClr val="C00000"/>
+          </a:solidFill>
+          <a:ln w="19050">
+            <a:solidFill>
+              <a:schemeClr val="tx1"/>
+            </a:solidFill>
+          </a:ln>
+        </p:spPr>
+        <p:style>
+          <a:lnRef idx="2">
+            <a:schemeClr val="accent1">
+              <a:shade val="50000"/>
+            </a:schemeClr>
+          </a:lnRef>
+          <a:fillRef idx="1">
+            <a:schemeClr val="accent1"/>
+          </a:fillRef>
+          <a:effectRef idx="0">
+            <a:schemeClr val="accent1"/>
+          </a:effectRef>
+          <a:fontRef idx="minor">
+            <a:schemeClr val="lt1"/>
+          </a:fontRef>
+        </p:style>
+        <p:txBody>
+          <a:bodyPr rtlCol="0" anchor="ctr"/>
+          <a:lstStyle/>
+          <a:p>
+            <a:pPr algn="ctr"/>
+            <a:endParaRPr lang="de-DE"/>
+          </a:p>
+        </p:txBody>
+      </p:sp>
+      <p:sp>
+        <p:nvSpPr>
+          <p:cNvPr id="45" name="Textfeld 44"/>
+          <p:cNvSpPr txBox="1"/>
+          <p:nvPr/>
+        </p:nvSpPr>
+        <p:spPr>
+          <a:xfrm>
+            <a:off x="2411287" y="3181477"/>
+            <a:ext cx="540533" cy="246221"/>
+          </a:xfrm>
+          <a:prstGeom prst="rect">
+            <a:avLst/>
+          </a:prstGeom>
+          <a:noFill/>
+        </p:spPr>
+        <p:txBody>
+          <a:bodyPr wrap="none" rtlCol="0">
+            <a:spAutoFit/>
+          </a:bodyPr>
+          <a:lstStyle/>
+          <a:p>
+            <a:r>
+              <a:rPr lang="de-DE" sz="1000" b="1" dirty="0" err="1" smtClean="0">
+                <a:solidFill>
+                  <a:srgbClr val="C00000"/>
+                </a:solidFill>
+                <a:latin typeface="Arial" panose="020B0604020202020204" pitchFamily="34" charset="0"/>
+                <a:cs typeface="Arial" panose="020B0604020202020204" pitchFamily="34" charset="0"/>
+              </a:rPr>
+              <a:t>origin</a:t>
+            </a:r>
+            <a:endParaRPr lang="de-DE" sz="1000" b="1" dirty="0" smtClean="0">
+              <a:solidFill>
+                <a:srgbClr val="00B050"/>
+              </a:solidFill>
+              <a:latin typeface="Arial" panose="020B0604020202020204" pitchFamily="34" charset="0"/>
+              <a:cs typeface="Arial" panose="020B0604020202020204" pitchFamily="34" charset="0"/>
+            </a:endParaRPr>
+          </a:p>
+        </p:txBody>
+      </p:sp>
+      <p:sp>
+        <p:nvSpPr>
+          <p:cNvPr id="46" name="Textfeld 45"/>
+          <p:cNvSpPr txBox="1"/>
+          <p:nvPr/>
+        </p:nvSpPr>
+        <p:spPr>
+          <a:xfrm>
+            <a:off x="2231267" y="2445979"/>
+            <a:ext cx="540533" cy="246221"/>
+          </a:xfrm>
+          <a:prstGeom prst="rect">
+            <a:avLst/>
+          </a:prstGeom>
+          <a:noFill/>
+        </p:spPr>
+        <p:txBody>
+          <a:bodyPr wrap="none" rtlCol="0">
+            <a:spAutoFit/>
+          </a:bodyPr>
+          <a:lstStyle/>
+          <a:p>
+            <a:r>
+              <a:rPr lang="de-DE" sz="1000" b="1" dirty="0" err="1" smtClean="0">
+                <a:solidFill>
+                  <a:srgbClr val="C00000"/>
+                </a:solidFill>
+                <a:latin typeface="Arial" panose="020B0604020202020204" pitchFamily="34" charset="0"/>
+                <a:cs typeface="Arial" panose="020B0604020202020204" pitchFamily="34" charset="0"/>
+              </a:rPr>
+              <a:t>origin</a:t>
+            </a:r>
+            <a:endParaRPr lang="de-DE" sz="1000" b="1" dirty="0" smtClean="0">
+              <a:solidFill>
+                <a:srgbClr val="00B050"/>
+              </a:solidFill>
+              <a:latin typeface="Arial" panose="020B0604020202020204" pitchFamily="34" charset="0"/>
+              <a:cs typeface="Arial" panose="020B0604020202020204" pitchFamily="34" charset="0"/>
+            </a:endParaRPr>
+          </a:p>
+        </p:txBody>
+      </p:sp>
+      <p:cxnSp>
+        <p:nvCxnSpPr>
+          <p:cNvPr id="49" name="Gerade Verbindung 48"/>
+          <p:cNvCxnSpPr/>
+          <p:nvPr/>
+        </p:nvCxnSpPr>
+        <p:spPr>
+          <a:xfrm>
+            <a:off x="6162163" y="2348880"/>
+            <a:ext cx="0" cy="1440160"/>
+          </a:xfrm>
+          <a:prstGeom prst="line">
+            <a:avLst/>
+          </a:prstGeom>
+          <a:ln w="19050">
+            <a:solidFill>
+              <a:srgbClr val="00B050"/>
+            </a:solidFill>
+            <a:headEnd type="none" w="med" len="med"/>
+            <a:tailEnd type="none" w="med" len="med"/>
+          </a:ln>
+        </p:spPr>
+        <p:style>
+          <a:lnRef idx="1">
+            <a:schemeClr val="accent1"/>
+          </a:lnRef>
+          <a:fillRef idx="0">
+            <a:schemeClr val="accent1"/>
+          </a:fillRef>
+          <a:effectRef idx="0">
+            <a:schemeClr val="accent1"/>
+          </a:effectRef>
+          <a:fontRef idx="minor">
+            <a:schemeClr val="tx1"/>
+          </a:fontRef>
+        </p:style>
+      </p:cxnSp>
+      <p:cxnSp>
+        <p:nvCxnSpPr>
+          <p:cNvPr id="50" name="Gerade Verbindung mit Pfeil 49"/>
+          <p:cNvCxnSpPr/>
+          <p:nvPr/>
+        </p:nvCxnSpPr>
+        <p:spPr>
+          <a:xfrm>
+            <a:off x="5112759" y="2471564"/>
+            <a:ext cx="1049404" cy="0"/>
+          </a:xfrm>
+          <a:prstGeom prst="straightConnector1">
+            <a:avLst/>
+          </a:prstGeom>
+          <a:ln w="19050">
+            <a:solidFill>
+              <a:srgbClr val="00B050"/>
+            </a:solidFill>
+            <a:headEnd type="arrow"/>
+            <a:tailEnd type="arrow"/>
+          </a:ln>
+        </p:spPr>
+        <p:style>
+          <a:lnRef idx="1">
+            <a:schemeClr val="accent1"/>
+          </a:lnRef>
+          <a:fillRef idx="0">
+            <a:schemeClr val="accent1"/>
+          </a:fillRef>
+          <a:effectRef idx="0">
+            <a:schemeClr val="accent1"/>
+          </a:effectRef>
+          <a:fontRef idx="minor">
+            <a:schemeClr val="tx1"/>
+          </a:fontRef>
+        </p:style>
+      </p:cxnSp>
+      <p:sp>
+        <p:nvSpPr>
+          <p:cNvPr id="52" name="Textfeld 51"/>
+          <p:cNvSpPr txBox="1"/>
+          <p:nvPr/>
+        </p:nvSpPr>
+        <p:spPr>
+          <a:xfrm>
+            <a:off x="5285068" y="2251860"/>
+            <a:ext cx="639919" cy="246221"/>
+          </a:xfrm>
+          <a:prstGeom prst="rect">
+            <a:avLst/>
+          </a:prstGeom>
+          <a:noFill/>
+        </p:spPr>
+        <p:txBody>
+          <a:bodyPr wrap="none" rtlCol="0">
+            <a:spAutoFit/>
+          </a:bodyPr>
+          <a:lstStyle/>
+          <a:p>
+            <a:r>
+              <a:rPr lang="de-DE" sz="1000" b="1" dirty="0" err="1" smtClean="0">
+                <a:solidFill>
+                  <a:srgbClr val="00B050"/>
+                </a:solidFill>
+                <a:latin typeface="Arial" panose="020B0604020202020204" pitchFamily="34" charset="0"/>
+                <a:cs typeface="Arial" panose="020B0604020202020204" pitchFamily="34" charset="0"/>
+              </a:rPr>
+              <a:t>offset.x</a:t>
+            </a:r>
+            <a:endParaRPr lang="de-DE" sz="1000" b="1" dirty="0">
+              <a:solidFill>
+                <a:srgbClr val="00B050"/>
+              </a:solidFill>
+              <a:latin typeface="Arial" panose="020B0604020202020204" pitchFamily="34" charset="0"/>
+              <a:cs typeface="Arial" panose="020B0604020202020204" pitchFamily="34" charset="0"/>
+            </a:endParaRPr>
+          </a:p>
+        </p:txBody>
+      </p:sp>
+      <p:sp>
+        <p:nvSpPr>
+          <p:cNvPr id="53" name="Textfeld 52"/>
+          <p:cNvSpPr txBox="1"/>
+          <p:nvPr/>
+        </p:nvSpPr>
+        <p:spPr>
+          <a:xfrm>
+            <a:off x="2447764" y="2102659"/>
+            <a:ext cx="856325" cy="246221"/>
+          </a:xfrm>
+          <a:prstGeom prst="rect">
+            <a:avLst/>
+          </a:prstGeom>
+          <a:noFill/>
+        </p:spPr>
+        <p:txBody>
+          <a:bodyPr wrap="none" rtlCol="0">
+            <a:spAutoFit/>
+          </a:bodyPr>
+          <a:lstStyle/>
+          <a:p>
+            <a:r>
+              <a:rPr lang="de-DE" sz="1000" b="1" dirty="0" err="1" smtClean="0">
+                <a:solidFill>
+                  <a:srgbClr val="00B050"/>
+                </a:solidFill>
+                <a:latin typeface="Arial" panose="020B0604020202020204" pitchFamily="34" charset="0"/>
+                <a:cs typeface="Arial" panose="020B0604020202020204" pitchFamily="34" charset="0"/>
+              </a:rPr>
+              <a:t>offset.x</a:t>
+            </a:r>
+            <a:r>
+              <a:rPr lang="de-DE" sz="1000" b="1" dirty="0" smtClean="0">
+                <a:solidFill>
+                  <a:srgbClr val="00B050"/>
+                </a:solidFill>
+                <a:latin typeface="Arial" panose="020B0604020202020204" pitchFamily="34" charset="0"/>
+                <a:cs typeface="Arial" panose="020B0604020202020204" pitchFamily="34" charset="0"/>
+              </a:rPr>
+              <a:t> = 0</a:t>
+            </a:r>
+            <a:endParaRPr lang="de-DE" sz="1000" b="1" dirty="0">
+              <a:solidFill>
+                <a:srgbClr val="00B050"/>
+              </a:solidFill>
               <a:latin typeface="Arial" panose="020B0604020202020204" pitchFamily="34" charset="0"/>
               <a:cs typeface="Arial" panose="020B0604020202020204" pitchFamily="34" charset="0"/>
             </a:endParaRPr>
@@ -26966,6 +27545,13 @@
   <p:clrMapOvr>
     <a:masterClrMapping/>
   </p:clrMapOvr>
+  <p:timing>
+    <p:tnLst>
+      <p:par>
+        <p:cTn id="1" dur="indefinite" restart="never" nodeType="tmRoot"/>
+      </p:par>
+    </p:tnLst>
+  </p:timing>
 </p:sld>
 </file>
 

</xml_diff>